<commit_message>
Update Error flag definition in EventMetaData.
</commit_message>
<xml_diff>
--- a/daq/copper/doc/ErrorEvent_EventMetaData.pptx
+++ b/daq/copper/doc/ErrorEvent_EventMetaData.pptx
@@ -15,6 +15,7 @@
     <p:sldId id="263" r:id="rId9"/>
     <p:sldId id="267" r:id="rId10"/>
     <p:sldId id="269" r:id="rId11"/>
+    <p:sldId id="270" r:id="rId12"/>
   </p:sldIdLst>
   <p:sldSz cx="9144000" cy="6858000" type="screen4x3"/>
   <p:notesSz cx="6858000" cy="9144000"/>
@@ -121,6 +122,10 @@
 </p:presentation>
 </file>
 
+<file path=ppt/revisionInfo.xml><?xml version="1.0" encoding="utf-8"?>
+<p1510:revInfo xmlns:a="http://schemas.openxmlformats.org/drawingml/2006/main" xmlns:r="http://schemas.openxmlformats.org/officeDocument/2006/relationships" xmlns:p1510="http://schemas.microsoft.com/office/powerpoint/2015/10/main"/>
+</file>
+
 <file path=ppt/slideLayouts/slideLayout1.xml><?xml version="1.0" encoding="utf-8"?>
 <p:sldLayout xmlns:a="http://schemas.openxmlformats.org/drawingml/2006/main" xmlns:r="http://schemas.openxmlformats.org/officeDocument/2006/relationships" xmlns:p="http://schemas.openxmlformats.org/presentationml/2006/main" type="title" preserve="1">
   <p:cSld name="タイトル スライド">
@@ -163,7 +168,7 @@
           </a:lstStyle>
           <a:p>
             <a:r>
-              <a:rPr lang="ja-JP" altLang="en-US" smtClean="0"/>
+              <a:rPr lang="ja-JP" altLang="en-US"/>
               <a:t>マスター タイトルの書式設定</a:t>
             </a:r>
             <a:endParaRPr lang="en-US" dirty="0"/>
@@ -228,7 +233,7 @@
           </a:lstStyle>
           <a:p>
             <a:r>
-              <a:rPr lang="ja-JP" altLang="en-US" smtClean="0"/>
+              <a:rPr lang="ja-JP" altLang="en-US"/>
               <a:t>マスター サブタイトルの書式設定</a:t>
             </a:r>
             <a:endParaRPr lang="en-US" dirty="0"/>
@@ -252,7 +257,7 @@
           <a:p>
             <a:fld id="{79A173A2-992D-4C10-B15F-B6CEAE468778}" type="datetimeFigureOut">
               <a:rPr kumimoji="1" lang="ja-JP" altLang="en-US" smtClean="0"/>
-              <a:t>2016/7/8</a:t>
+              <a:t>2017/5/30</a:t>
             </a:fld>
             <a:endParaRPr kumimoji="1" lang="ja-JP" altLang="en-US" dirty="0"/>
           </a:p>
@@ -346,7 +351,7 @@
           <a:lstStyle/>
           <a:p>
             <a:r>
-              <a:rPr lang="ja-JP" altLang="en-US" smtClean="0"/>
+              <a:rPr lang="ja-JP" altLang="en-US"/>
               <a:t>マスター タイトルの書式設定</a:t>
             </a:r>
             <a:endParaRPr lang="en-US" dirty="0"/>
@@ -370,67 +375,67 @@
           <a:p>
             <a:pPr lvl="0"/>
             <a:r>
-              <a:rPr lang="ja-JP" altLang="en-US" smtClean="0"/>
+              <a:rPr lang="ja-JP" altLang="en-US"/>
               <a:t>マスター テキストの書式設定</a:t>
             </a:r>
           </a:p>
           <a:p>
             <a:pPr lvl="1"/>
             <a:r>
-              <a:rPr lang="ja-JP" altLang="en-US" smtClean="0"/>
+              <a:rPr lang="ja-JP" altLang="en-US"/>
               <a:t>第 </a:t>
             </a:r>
             <a:r>
-              <a:rPr lang="en-US" altLang="ja-JP" smtClean="0"/>
+              <a:rPr lang="en-US" altLang="ja-JP"/>
               <a:t>2 </a:t>
             </a:r>
             <a:r>
-              <a:rPr lang="ja-JP" altLang="en-US" smtClean="0"/>
+              <a:rPr lang="ja-JP" altLang="en-US"/>
               <a:t>レベル</a:t>
             </a:r>
           </a:p>
           <a:p>
             <a:pPr lvl="2"/>
             <a:r>
-              <a:rPr lang="ja-JP" altLang="en-US" smtClean="0"/>
+              <a:rPr lang="ja-JP" altLang="en-US"/>
               <a:t>第 </a:t>
             </a:r>
             <a:r>
-              <a:rPr lang="en-US" altLang="ja-JP" smtClean="0"/>
+              <a:rPr lang="en-US" altLang="ja-JP"/>
               <a:t>3 </a:t>
             </a:r>
             <a:r>
-              <a:rPr lang="ja-JP" altLang="en-US" smtClean="0"/>
+              <a:rPr lang="ja-JP" altLang="en-US"/>
               <a:t>レベル</a:t>
             </a:r>
           </a:p>
           <a:p>
             <a:pPr lvl="3"/>
             <a:r>
-              <a:rPr lang="ja-JP" altLang="en-US" smtClean="0"/>
+              <a:rPr lang="ja-JP" altLang="en-US"/>
               <a:t>第 </a:t>
             </a:r>
             <a:r>
-              <a:rPr lang="en-US" altLang="ja-JP" smtClean="0"/>
+              <a:rPr lang="en-US" altLang="ja-JP"/>
               <a:t>4 </a:t>
             </a:r>
             <a:r>
-              <a:rPr lang="ja-JP" altLang="en-US" smtClean="0"/>
+              <a:rPr lang="ja-JP" altLang="en-US"/>
               <a:t>レベル</a:t>
             </a:r>
           </a:p>
           <a:p>
             <a:pPr lvl="4"/>
             <a:r>
-              <a:rPr lang="ja-JP" altLang="en-US" smtClean="0"/>
+              <a:rPr lang="ja-JP" altLang="en-US"/>
               <a:t>第 </a:t>
             </a:r>
             <a:r>
-              <a:rPr lang="en-US" altLang="ja-JP" smtClean="0"/>
+              <a:rPr lang="en-US" altLang="ja-JP"/>
               <a:t>5 </a:t>
             </a:r>
             <a:r>
-              <a:rPr lang="ja-JP" altLang="en-US" smtClean="0"/>
+              <a:rPr lang="ja-JP" altLang="en-US"/>
               <a:t>レベル</a:t>
             </a:r>
             <a:endParaRPr lang="en-US" dirty="0"/>
@@ -454,7 +459,7 @@
           <a:p>
             <a:fld id="{79A173A2-992D-4C10-B15F-B6CEAE468778}" type="datetimeFigureOut">
               <a:rPr kumimoji="1" lang="ja-JP" altLang="en-US" smtClean="0"/>
-              <a:t>2016/7/8</a:t>
+              <a:t>2017/5/30</a:t>
             </a:fld>
             <a:endParaRPr kumimoji="1" lang="ja-JP" altLang="en-US" dirty="0"/>
           </a:p>
@@ -553,7 +558,7 @@
           <a:lstStyle/>
           <a:p>
             <a:r>
-              <a:rPr lang="ja-JP" altLang="en-US" smtClean="0"/>
+              <a:rPr lang="ja-JP" altLang="en-US"/>
               <a:t>マスター タイトルの書式設定</a:t>
             </a:r>
             <a:endParaRPr lang="en-US" dirty="0"/>
@@ -582,67 +587,67 @@
           <a:p>
             <a:pPr lvl="0"/>
             <a:r>
-              <a:rPr lang="ja-JP" altLang="en-US" smtClean="0"/>
+              <a:rPr lang="ja-JP" altLang="en-US"/>
               <a:t>マスター テキストの書式設定</a:t>
             </a:r>
           </a:p>
           <a:p>
             <a:pPr lvl="1"/>
             <a:r>
-              <a:rPr lang="ja-JP" altLang="en-US" smtClean="0"/>
+              <a:rPr lang="ja-JP" altLang="en-US"/>
               <a:t>第 </a:t>
             </a:r>
             <a:r>
-              <a:rPr lang="en-US" altLang="ja-JP" smtClean="0"/>
+              <a:rPr lang="en-US" altLang="ja-JP"/>
               <a:t>2 </a:t>
             </a:r>
             <a:r>
-              <a:rPr lang="ja-JP" altLang="en-US" smtClean="0"/>
+              <a:rPr lang="ja-JP" altLang="en-US"/>
               <a:t>レベル</a:t>
             </a:r>
           </a:p>
           <a:p>
             <a:pPr lvl="2"/>
             <a:r>
-              <a:rPr lang="ja-JP" altLang="en-US" smtClean="0"/>
+              <a:rPr lang="ja-JP" altLang="en-US"/>
               <a:t>第 </a:t>
             </a:r>
             <a:r>
-              <a:rPr lang="en-US" altLang="ja-JP" smtClean="0"/>
+              <a:rPr lang="en-US" altLang="ja-JP"/>
               <a:t>3 </a:t>
             </a:r>
             <a:r>
-              <a:rPr lang="ja-JP" altLang="en-US" smtClean="0"/>
+              <a:rPr lang="ja-JP" altLang="en-US"/>
               <a:t>レベル</a:t>
             </a:r>
           </a:p>
           <a:p>
             <a:pPr lvl="3"/>
             <a:r>
-              <a:rPr lang="ja-JP" altLang="en-US" smtClean="0"/>
+              <a:rPr lang="ja-JP" altLang="en-US"/>
               <a:t>第 </a:t>
             </a:r>
             <a:r>
-              <a:rPr lang="en-US" altLang="ja-JP" smtClean="0"/>
+              <a:rPr lang="en-US" altLang="ja-JP"/>
               <a:t>4 </a:t>
             </a:r>
             <a:r>
-              <a:rPr lang="ja-JP" altLang="en-US" smtClean="0"/>
+              <a:rPr lang="ja-JP" altLang="en-US"/>
               <a:t>レベル</a:t>
             </a:r>
           </a:p>
           <a:p>
             <a:pPr lvl="4"/>
             <a:r>
-              <a:rPr lang="ja-JP" altLang="en-US" smtClean="0"/>
+              <a:rPr lang="ja-JP" altLang="en-US"/>
               <a:t>第 </a:t>
             </a:r>
             <a:r>
-              <a:rPr lang="en-US" altLang="ja-JP" smtClean="0"/>
+              <a:rPr lang="en-US" altLang="ja-JP"/>
               <a:t>5 </a:t>
             </a:r>
             <a:r>
-              <a:rPr lang="ja-JP" altLang="en-US" smtClean="0"/>
+              <a:rPr lang="ja-JP" altLang="en-US"/>
               <a:t>レベル</a:t>
             </a:r>
             <a:endParaRPr lang="en-US" dirty="0"/>
@@ -666,7 +671,7 @@
           <a:p>
             <a:fld id="{79A173A2-992D-4C10-B15F-B6CEAE468778}" type="datetimeFigureOut">
               <a:rPr kumimoji="1" lang="ja-JP" altLang="en-US" smtClean="0"/>
-              <a:t>2016/7/8</a:t>
+              <a:t>2017/5/30</a:t>
             </a:fld>
             <a:endParaRPr kumimoji="1" lang="ja-JP" altLang="en-US" dirty="0"/>
           </a:p>
@@ -760,7 +765,7 @@
           <a:lstStyle/>
           <a:p>
             <a:r>
-              <a:rPr lang="ja-JP" altLang="en-US" smtClean="0"/>
+              <a:rPr lang="ja-JP" altLang="en-US"/>
               <a:t>マスター タイトルの書式設定</a:t>
             </a:r>
             <a:endParaRPr lang="en-US" dirty="0"/>
@@ -784,67 +789,67 @@
           <a:p>
             <a:pPr lvl="0"/>
             <a:r>
-              <a:rPr lang="ja-JP" altLang="en-US" smtClean="0"/>
+              <a:rPr lang="ja-JP" altLang="en-US"/>
               <a:t>マスター テキストの書式設定</a:t>
             </a:r>
           </a:p>
           <a:p>
             <a:pPr lvl="1"/>
             <a:r>
-              <a:rPr lang="ja-JP" altLang="en-US" smtClean="0"/>
+              <a:rPr lang="ja-JP" altLang="en-US"/>
               <a:t>第 </a:t>
             </a:r>
             <a:r>
-              <a:rPr lang="en-US" altLang="ja-JP" smtClean="0"/>
+              <a:rPr lang="en-US" altLang="ja-JP"/>
               <a:t>2 </a:t>
             </a:r>
             <a:r>
-              <a:rPr lang="ja-JP" altLang="en-US" smtClean="0"/>
+              <a:rPr lang="ja-JP" altLang="en-US"/>
               <a:t>レベル</a:t>
             </a:r>
           </a:p>
           <a:p>
             <a:pPr lvl="2"/>
             <a:r>
-              <a:rPr lang="ja-JP" altLang="en-US" smtClean="0"/>
+              <a:rPr lang="ja-JP" altLang="en-US"/>
               <a:t>第 </a:t>
             </a:r>
             <a:r>
-              <a:rPr lang="en-US" altLang="ja-JP" smtClean="0"/>
+              <a:rPr lang="en-US" altLang="ja-JP"/>
               <a:t>3 </a:t>
             </a:r>
             <a:r>
-              <a:rPr lang="ja-JP" altLang="en-US" smtClean="0"/>
+              <a:rPr lang="ja-JP" altLang="en-US"/>
               <a:t>レベル</a:t>
             </a:r>
           </a:p>
           <a:p>
             <a:pPr lvl="3"/>
             <a:r>
-              <a:rPr lang="ja-JP" altLang="en-US" smtClean="0"/>
+              <a:rPr lang="ja-JP" altLang="en-US"/>
               <a:t>第 </a:t>
             </a:r>
             <a:r>
-              <a:rPr lang="en-US" altLang="ja-JP" smtClean="0"/>
+              <a:rPr lang="en-US" altLang="ja-JP"/>
               <a:t>4 </a:t>
             </a:r>
             <a:r>
-              <a:rPr lang="ja-JP" altLang="en-US" smtClean="0"/>
+              <a:rPr lang="ja-JP" altLang="en-US"/>
               <a:t>レベル</a:t>
             </a:r>
           </a:p>
           <a:p>
             <a:pPr lvl="4"/>
             <a:r>
-              <a:rPr lang="ja-JP" altLang="en-US" smtClean="0"/>
+              <a:rPr lang="ja-JP" altLang="en-US"/>
               <a:t>第 </a:t>
             </a:r>
             <a:r>
-              <a:rPr lang="en-US" altLang="ja-JP" smtClean="0"/>
+              <a:rPr lang="en-US" altLang="ja-JP"/>
               <a:t>5 </a:t>
             </a:r>
             <a:r>
-              <a:rPr lang="ja-JP" altLang="en-US" smtClean="0"/>
+              <a:rPr lang="ja-JP" altLang="en-US"/>
               <a:t>レベル</a:t>
             </a:r>
             <a:endParaRPr lang="en-US" dirty="0"/>
@@ -868,7 +873,7 @@
           <a:p>
             <a:fld id="{79A173A2-992D-4C10-B15F-B6CEAE468778}" type="datetimeFigureOut">
               <a:rPr kumimoji="1" lang="ja-JP" altLang="en-US" smtClean="0"/>
-              <a:t>2016/7/8</a:t>
+              <a:t>2017/5/30</a:t>
             </a:fld>
             <a:endParaRPr kumimoji="1" lang="ja-JP" altLang="en-US" dirty="0"/>
           </a:p>
@@ -971,7 +976,7 @@
           </a:lstStyle>
           <a:p>
             <a:r>
-              <a:rPr lang="ja-JP" altLang="en-US" smtClean="0"/>
+              <a:rPr lang="ja-JP" altLang="en-US"/>
               <a:t>マスター タイトルの書式設定</a:t>
             </a:r>
             <a:endParaRPr lang="en-US" dirty="0"/>
@@ -1089,7 +1094,7 @@
           <a:p>
             <a:pPr lvl="0"/>
             <a:r>
-              <a:rPr lang="ja-JP" altLang="en-US" smtClean="0"/>
+              <a:rPr lang="ja-JP" altLang="en-US"/>
               <a:t>マスター テキストの書式設定</a:t>
             </a:r>
           </a:p>
@@ -1112,7 +1117,7 @@
           <a:p>
             <a:fld id="{79A173A2-992D-4C10-B15F-B6CEAE468778}" type="datetimeFigureOut">
               <a:rPr kumimoji="1" lang="ja-JP" altLang="en-US" smtClean="0"/>
-              <a:t>2016/7/8</a:t>
+              <a:t>2017/5/30</a:t>
             </a:fld>
             <a:endParaRPr kumimoji="1" lang="ja-JP" altLang="en-US" dirty="0"/>
           </a:p>
@@ -1206,7 +1211,7 @@
           <a:lstStyle/>
           <a:p>
             <a:r>
-              <a:rPr lang="ja-JP" altLang="en-US" smtClean="0"/>
+              <a:rPr lang="ja-JP" altLang="en-US"/>
               <a:t>マスター タイトルの書式設定</a:t>
             </a:r>
             <a:endParaRPr lang="en-US" dirty="0"/>
@@ -1235,67 +1240,67 @@
           <a:p>
             <a:pPr lvl="0"/>
             <a:r>
-              <a:rPr lang="ja-JP" altLang="en-US" smtClean="0"/>
+              <a:rPr lang="ja-JP" altLang="en-US"/>
               <a:t>マスター テキストの書式設定</a:t>
             </a:r>
           </a:p>
           <a:p>
             <a:pPr lvl="1"/>
             <a:r>
-              <a:rPr lang="ja-JP" altLang="en-US" smtClean="0"/>
+              <a:rPr lang="ja-JP" altLang="en-US"/>
               <a:t>第 </a:t>
             </a:r>
             <a:r>
-              <a:rPr lang="en-US" altLang="ja-JP" smtClean="0"/>
+              <a:rPr lang="en-US" altLang="ja-JP"/>
               <a:t>2 </a:t>
             </a:r>
             <a:r>
-              <a:rPr lang="ja-JP" altLang="en-US" smtClean="0"/>
+              <a:rPr lang="ja-JP" altLang="en-US"/>
               <a:t>レベル</a:t>
             </a:r>
           </a:p>
           <a:p>
             <a:pPr lvl="2"/>
             <a:r>
-              <a:rPr lang="ja-JP" altLang="en-US" smtClean="0"/>
+              <a:rPr lang="ja-JP" altLang="en-US"/>
               <a:t>第 </a:t>
             </a:r>
             <a:r>
-              <a:rPr lang="en-US" altLang="ja-JP" smtClean="0"/>
+              <a:rPr lang="en-US" altLang="ja-JP"/>
               <a:t>3 </a:t>
             </a:r>
             <a:r>
-              <a:rPr lang="ja-JP" altLang="en-US" smtClean="0"/>
+              <a:rPr lang="ja-JP" altLang="en-US"/>
               <a:t>レベル</a:t>
             </a:r>
           </a:p>
           <a:p>
             <a:pPr lvl="3"/>
             <a:r>
-              <a:rPr lang="ja-JP" altLang="en-US" smtClean="0"/>
+              <a:rPr lang="ja-JP" altLang="en-US"/>
               <a:t>第 </a:t>
             </a:r>
             <a:r>
-              <a:rPr lang="en-US" altLang="ja-JP" smtClean="0"/>
+              <a:rPr lang="en-US" altLang="ja-JP"/>
               <a:t>4 </a:t>
             </a:r>
             <a:r>
-              <a:rPr lang="ja-JP" altLang="en-US" smtClean="0"/>
+              <a:rPr lang="ja-JP" altLang="en-US"/>
               <a:t>レベル</a:t>
             </a:r>
           </a:p>
           <a:p>
             <a:pPr lvl="4"/>
             <a:r>
-              <a:rPr lang="ja-JP" altLang="en-US" smtClean="0"/>
+              <a:rPr lang="ja-JP" altLang="en-US"/>
               <a:t>第 </a:t>
             </a:r>
             <a:r>
-              <a:rPr lang="en-US" altLang="ja-JP" smtClean="0"/>
+              <a:rPr lang="en-US" altLang="ja-JP"/>
               <a:t>5 </a:t>
             </a:r>
             <a:r>
-              <a:rPr lang="ja-JP" altLang="en-US" smtClean="0"/>
+              <a:rPr lang="ja-JP" altLang="en-US"/>
               <a:t>レベル</a:t>
             </a:r>
             <a:endParaRPr lang="en-US" dirty="0"/>
@@ -1324,67 +1329,67 @@
           <a:p>
             <a:pPr lvl="0"/>
             <a:r>
-              <a:rPr lang="ja-JP" altLang="en-US" smtClean="0"/>
+              <a:rPr lang="ja-JP" altLang="en-US"/>
               <a:t>マスター テキストの書式設定</a:t>
             </a:r>
           </a:p>
           <a:p>
             <a:pPr lvl="1"/>
             <a:r>
-              <a:rPr lang="ja-JP" altLang="en-US" smtClean="0"/>
+              <a:rPr lang="ja-JP" altLang="en-US"/>
               <a:t>第 </a:t>
             </a:r>
             <a:r>
-              <a:rPr lang="en-US" altLang="ja-JP" smtClean="0"/>
+              <a:rPr lang="en-US" altLang="ja-JP"/>
               <a:t>2 </a:t>
             </a:r>
             <a:r>
-              <a:rPr lang="ja-JP" altLang="en-US" smtClean="0"/>
+              <a:rPr lang="ja-JP" altLang="en-US"/>
               <a:t>レベル</a:t>
             </a:r>
           </a:p>
           <a:p>
             <a:pPr lvl="2"/>
             <a:r>
-              <a:rPr lang="ja-JP" altLang="en-US" smtClean="0"/>
+              <a:rPr lang="ja-JP" altLang="en-US"/>
               <a:t>第 </a:t>
             </a:r>
             <a:r>
-              <a:rPr lang="en-US" altLang="ja-JP" smtClean="0"/>
+              <a:rPr lang="en-US" altLang="ja-JP"/>
               <a:t>3 </a:t>
             </a:r>
             <a:r>
-              <a:rPr lang="ja-JP" altLang="en-US" smtClean="0"/>
+              <a:rPr lang="ja-JP" altLang="en-US"/>
               <a:t>レベル</a:t>
             </a:r>
           </a:p>
           <a:p>
             <a:pPr lvl="3"/>
             <a:r>
-              <a:rPr lang="ja-JP" altLang="en-US" smtClean="0"/>
+              <a:rPr lang="ja-JP" altLang="en-US"/>
               <a:t>第 </a:t>
             </a:r>
             <a:r>
-              <a:rPr lang="en-US" altLang="ja-JP" smtClean="0"/>
+              <a:rPr lang="en-US" altLang="ja-JP"/>
               <a:t>4 </a:t>
             </a:r>
             <a:r>
-              <a:rPr lang="ja-JP" altLang="en-US" smtClean="0"/>
+              <a:rPr lang="ja-JP" altLang="en-US"/>
               <a:t>レベル</a:t>
             </a:r>
           </a:p>
           <a:p>
             <a:pPr lvl="4"/>
             <a:r>
-              <a:rPr lang="ja-JP" altLang="en-US" smtClean="0"/>
+              <a:rPr lang="ja-JP" altLang="en-US"/>
               <a:t>第 </a:t>
             </a:r>
             <a:r>
-              <a:rPr lang="en-US" altLang="ja-JP" smtClean="0"/>
+              <a:rPr lang="en-US" altLang="ja-JP"/>
               <a:t>5 </a:t>
             </a:r>
             <a:r>
-              <a:rPr lang="ja-JP" altLang="en-US" smtClean="0"/>
+              <a:rPr lang="ja-JP" altLang="en-US"/>
               <a:t>レベル</a:t>
             </a:r>
             <a:endParaRPr lang="en-US" dirty="0"/>
@@ -1408,7 +1413,7 @@
           <a:p>
             <a:fld id="{79A173A2-992D-4C10-B15F-B6CEAE468778}" type="datetimeFigureOut">
               <a:rPr kumimoji="1" lang="ja-JP" altLang="en-US" smtClean="0"/>
-              <a:t>2016/7/8</a:t>
+              <a:t>2017/5/30</a:t>
             </a:fld>
             <a:endParaRPr kumimoji="1" lang="ja-JP" altLang="en-US" dirty="0"/>
           </a:p>
@@ -1507,7 +1512,7 @@
           <a:lstStyle/>
           <a:p>
             <a:r>
-              <a:rPr lang="ja-JP" altLang="en-US" smtClean="0"/>
+              <a:rPr lang="ja-JP" altLang="en-US"/>
               <a:t>マスター タイトルの書式設定</a:t>
             </a:r>
             <a:endParaRPr lang="en-US" dirty="0"/>
@@ -1573,7 +1578,7 @@
           <a:p>
             <a:pPr lvl="0"/>
             <a:r>
-              <a:rPr lang="ja-JP" altLang="en-US" smtClean="0"/>
+              <a:rPr lang="ja-JP" altLang="en-US"/>
               <a:t>マスター テキストの書式設定</a:t>
             </a:r>
           </a:p>
@@ -1601,67 +1606,67 @@
           <a:p>
             <a:pPr lvl="0"/>
             <a:r>
-              <a:rPr lang="ja-JP" altLang="en-US" smtClean="0"/>
+              <a:rPr lang="ja-JP" altLang="en-US"/>
               <a:t>マスター テキストの書式設定</a:t>
             </a:r>
           </a:p>
           <a:p>
             <a:pPr lvl="1"/>
             <a:r>
-              <a:rPr lang="ja-JP" altLang="en-US" smtClean="0"/>
+              <a:rPr lang="ja-JP" altLang="en-US"/>
               <a:t>第 </a:t>
             </a:r>
             <a:r>
-              <a:rPr lang="en-US" altLang="ja-JP" smtClean="0"/>
+              <a:rPr lang="en-US" altLang="ja-JP"/>
               <a:t>2 </a:t>
             </a:r>
             <a:r>
-              <a:rPr lang="ja-JP" altLang="en-US" smtClean="0"/>
+              <a:rPr lang="ja-JP" altLang="en-US"/>
               <a:t>レベル</a:t>
             </a:r>
           </a:p>
           <a:p>
             <a:pPr lvl="2"/>
             <a:r>
-              <a:rPr lang="ja-JP" altLang="en-US" smtClean="0"/>
+              <a:rPr lang="ja-JP" altLang="en-US"/>
               <a:t>第 </a:t>
             </a:r>
             <a:r>
-              <a:rPr lang="en-US" altLang="ja-JP" smtClean="0"/>
+              <a:rPr lang="en-US" altLang="ja-JP"/>
               <a:t>3 </a:t>
             </a:r>
             <a:r>
-              <a:rPr lang="ja-JP" altLang="en-US" smtClean="0"/>
+              <a:rPr lang="ja-JP" altLang="en-US"/>
               <a:t>レベル</a:t>
             </a:r>
           </a:p>
           <a:p>
             <a:pPr lvl="3"/>
             <a:r>
-              <a:rPr lang="ja-JP" altLang="en-US" smtClean="0"/>
+              <a:rPr lang="ja-JP" altLang="en-US"/>
               <a:t>第 </a:t>
             </a:r>
             <a:r>
-              <a:rPr lang="en-US" altLang="ja-JP" smtClean="0"/>
+              <a:rPr lang="en-US" altLang="ja-JP"/>
               <a:t>4 </a:t>
             </a:r>
             <a:r>
-              <a:rPr lang="ja-JP" altLang="en-US" smtClean="0"/>
+              <a:rPr lang="ja-JP" altLang="en-US"/>
               <a:t>レベル</a:t>
             </a:r>
           </a:p>
           <a:p>
             <a:pPr lvl="4"/>
             <a:r>
-              <a:rPr lang="ja-JP" altLang="en-US" smtClean="0"/>
+              <a:rPr lang="ja-JP" altLang="en-US"/>
               <a:t>第 </a:t>
             </a:r>
             <a:r>
-              <a:rPr lang="en-US" altLang="ja-JP" smtClean="0"/>
+              <a:rPr lang="en-US" altLang="ja-JP"/>
               <a:t>5 </a:t>
             </a:r>
             <a:r>
-              <a:rPr lang="ja-JP" altLang="en-US" smtClean="0"/>
+              <a:rPr lang="ja-JP" altLang="en-US"/>
               <a:t>レベル</a:t>
             </a:r>
             <a:endParaRPr lang="en-US" dirty="0"/>
@@ -1727,7 +1732,7 @@
           <a:p>
             <a:pPr lvl="0"/>
             <a:r>
-              <a:rPr lang="ja-JP" altLang="en-US" smtClean="0"/>
+              <a:rPr lang="ja-JP" altLang="en-US"/>
               <a:t>マスター テキストの書式設定</a:t>
             </a:r>
           </a:p>
@@ -1755,67 +1760,67 @@
           <a:p>
             <a:pPr lvl="0"/>
             <a:r>
-              <a:rPr lang="ja-JP" altLang="en-US" smtClean="0"/>
+              <a:rPr lang="ja-JP" altLang="en-US"/>
               <a:t>マスター テキストの書式設定</a:t>
             </a:r>
           </a:p>
           <a:p>
             <a:pPr lvl="1"/>
             <a:r>
-              <a:rPr lang="ja-JP" altLang="en-US" smtClean="0"/>
+              <a:rPr lang="ja-JP" altLang="en-US"/>
               <a:t>第 </a:t>
             </a:r>
             <a:r>
-              <a:rPr lang="en-US" altLang="ja-JP" smtClean="0"/>
+              <a:rPr lang="en-US" altLang="ja-JP"/>
               <a:t>2 </a:t>
             </a:r>
             <a:r>
-              <a:rPr lang="ja-JP" altLang="en-US" smtClean="0"/>
+              <a:rPr lang="ja-JP" altLang="en-US"/>
               <a:t>レベル</a:t>
             </a:r>
           </a:p>
           <a:p>
             <a:pPr lvl="2"/>
             <a:r>
-              <a:rPr lang="ja-JP" altLang="en-US" smtClean="0"/>
+              <a:rPr lang="ja-JP" altLang="en-US"/>
               <a:t>第 </a:t>
             </a:r>
             <a:r>
-              <a:rPr lang="en-US" altLang="ja-JP" smtClean="0"/>
+              <a:rPr lang="en-US" altLang="ja-JP"/>
               <a:t>3 </a:t>
             </a:r>
             <a:r>
-              <a:rPr lang="ja-JP" altLang="en-US" smtClean="0"/>
+              <a:rPr lang="ja-JP" altLang="en-US"/>
               <a:t>レベル</a:t>
             </a:r>
           </a:p>
           <a:p>
             <a:pPr lvl="3"/>
             <a:r>
-              <a:rPr lang="ja-JP" altLang="en-US" smtClean="0"/>
+              <a:rPr lang="ja-JP" altLang="en-US"/>
               <a:t>第 </a:t>
             </a:r>
             <a:r>
-              <a:rPr lang="en-US" altLang="ja-JP" smtClean="0"/>
+              <a:rPr lang="en-US" altLang="ja-JP"/>
               <a:t>4 </a:t>
             </a:r>
             <a:r>
-              <a:rPr lang="ja-JP" altLang="en-US" smtClean="0"/>
+              <a:rPr lang="ja-JP" altLang="en-US"/>
               <a:t>レベル</a:t>
             </a:r>
           </a:p>
           <a:p>
             <a:pPr lvl="4"/>
             <a:r>
-              <a:rPr lang="ja-JP" altLang="en-US" smtClean="0"/>
+              <a:rPr lang="ja-JP" altLang="en-US"/>
               <a:t>第 </a:t>
             </a:r>
             <a:r>
-              <a:rPr lang="en-US" altLang="ja-JP" smtClean="0"/>
+              <a:rPr lang="en-US" altLang="ja-JP"/>
               <a:t>5 </a:t>
             </a:r>
             <a:r>
-              <a:rPr lang="ja-JP" altLang="en-US" smtClean="0"/>
+              <a:rPr lang="ja-JP" altLang="en-US"/>
               <a:t>レベル</a:t>
             </a:r>
             <a:endParaRPr lang="en-US" dirty="0"/>
@@ -1839,7 +1844,7 @@
           <a:p>
             <a:fld id="{79A173A2-992D-4C10-B15F-B6CEAE468778}" type="datetimeFigureOut">
               <a:rPr kumimoji="1" lang="ja-JP" altLang="en-US" smtClean="0"/>
-              <a:t>2016/7/8</a:t>
+              <a:t>2017/5/30</a:t>
             </a:fld>
             <a:endParaRPr kumimoji="1" lang="ja-JP" altLang="en-US" dirty="0"/>
           </a:p>
@@ -1933,7 +1938,7 @@
           <a:lstStyle/>
           <a:p>
             <a:r>
-              <a:rPr lang="ja-JP" altLang="en-US" smtClean="0"/>
+              <a:rPr lang="ja-JP" altLang="en-US"/>
               <a:t>マスター タイトルの書式設定</a:t>
             </a:r>
             <a:endParaRPr lang="en-US" dirty="0"/>
@@ -1957,7 +1962,7 @@
           <a:p>
             <a:fld id="{79A173A2-992D-4C10-B15F-B6CEAE468778}" type="datetimeFigureOut">
               <a:rPr kumimoji="1" lang="ja-JP" altLang="en-US" smtClean="0"/>
-              <a:t>2016/7/8</a:t>
+              <a:t>2017/5/30</a:t>
             </a:fld>
             <a:endParaRPr kumimoji="1" lang="ja-JP" altLang="en-US" dirty="0"/>
           </a:p>
@@ -2052,7 +2057,7 @@
           <a:p>
             <a:fld id="{79A173A2-992D-4C10-B15F-B6CEAE468778}" type="datetimeFigureOut">
               <a:rPr kumimoji="1" lang="ja-JP" altLang="en-US" smtClean="0"/>
-              <a:t>2016/7/8</a:t>
+              <a:t>2017/5/30</a:t>
             </a:fld>
             <a:endParaRPr kumimoji="1" lang="ja-JP" altLang="en-US" dirty="0"/>
           </a:p>
@@ -2155,7 +2160,7 @@
           </a:lstStyle>
           <a:p>
             <a:r>
-              <a:rPr lang="ja-JP" altLang="en-US" smtClean="0"/>
+              <a:rPr lang="ja-JP" altLang="en-US"/>
               <a:t>マスター タイトルの書式設定</a:t>
             </a:r>
             <a:endParaRPr lang="en-US" dirty="0"/>
@@ -2212,67 +2217,67 @@
           <a:p>
             <a:pPr lvl="0"/>
             <a:r>
-              <a:rPr lang="ja-JP" altLang="en-US" smtClean="0"/>
+              <a:rPr lang="ja-JP" altLang="en-US"/>
               <a:t>マスター テキストの書式設定</a:t>
             </a:r>
           </a:p>
           <a:p>
             <a:pPr lvl="1"/>
             <a:r>
-              <a:rPr lang="ja-JP" altLang="en-US" smtClean="0"/>
+              <a:rPr lang="ja-JP" altLang="en-US"/>
               <a:t>第 </a:t>
             </a:r>
             <a:r>
-              <a:rPr lang="en-US" altLang="ja-JP" smtClean="0"/>
+              <a:rPr lang="en-US" altLang="ja-JP"/>
               <a:t>2 </a:t>
             </a:r>
             <a:r>
-              <a:rPr lang="ja-JP" altLang="en-US" smtClean="0"/>
+              <a:rPr lang="ja-JP" altLang="en-US"/>
               <a:t>レベル</a:t>
             </a:r>
           </a:p>
           <a:p>
             <a:pPr lvl="2"/>
             <a:r>
-              <a:rPr lang="ja-JP" altLang="en-US" smtClean="0"/>
+              <a:rPr lang="ja-JP" altLang="en-US"/>
               <a:t>第 </a:t>
             </a:r>
             <a:r>
-              <a:rPr lang="en-US" altLang="ja-JP" smtClean="0"/>
+              <a:rPr lang="en-US" altLang="ja-JP"/>
               <a:t>3 </a:t>
             </a:r>
             <a:r>
-              <a:rPr lang="ja-JP" altLang="en-US" smtClean="0"/>
+              <a:rPr lang="ja-JP" altLang="en-US"/>
               <a:t>レベル</a:t>
             </a:r>
           </a:p>
           <a:p>
             <a:pPr lvl="3"/>
             <a:r>
-              <a:rPr lang="ja-JP" altLang="en-US" smtClean="0"/>
+              <a:rPr lang="ja-JP" altLang="en-US"/>
               <a:t>第 </a:t>
             </a:r>
             <a:r>
-              <a:rPr lang="en-US" altLang="ja-JP" smtClean="0"/>
+              <a:rPr lang="en-US" altLang="ja-JP"/>
               <a:t>4 </a:t>
             </a:r>
             <a:r>
-              <a:rPr lang="ja-JP" altLang="en-US" smtClean="0"/>
+              <a:rPr lang="ja-JP" altLang="en-US"/>
               <a:t>レベル</a:t>
             </a:r>
           </a:p>
           <a:p>
             <a:pPr lvl="4"/>
             <a:r>
-              <a:rPr lang="ja-JP" altLang="en-US" smtClean="0"/>
+              <a:rPr lang="ja-JP" altLang="en-US"/>
               <a:t>第 </a:t>
             </a:r>
             <a:r>
-              <a:rPr lang="en-US" altLang="ja-JP" smtClean="0"/>
+              <a:rPr lang="en-US" altLang="ja-JP"/>
               <a:t>5 </a:t>
             </a:r>
             <a:r>
-              <a:rPr lang="ja-JP" altLang="en-US" smtClean="0"/>
+              <a:rPr lang="ja-JP" altLang="en-US"/>
               <a:t>レベル</a:t>
             </a:r>
             <a:endParaRPr lang="en-US" dirty="0"/>
@@ -2338,7 +2343,7 @@
           <a:p>
             <a:pPr lvl="0"/>
             <a:r>
-              <a:rPr lang="ja-JP" altLang="en-US" smtClean="0"/>
+              <a:rPr lang="ja-JP" altLang="en-US"/>
               <a:t>マスター テキストの書式設定</a:t>
             </a:r>
           </a:p>
@@ -2361,7 +2366,7 @@
           <a:p>
             <a:fld id="{79A173A2-992D-4C10-B15F-B6CEAE468778}" type="datetimeFigureOut">
               <a:rPr kumimoji="1" lang="ja-JP" altLang="en-US" smtClean="0"/>
-              <a:t>2016/7/8</a:t>
+              <a:t>2017/5/30</a:t>
             </a:fld>
             <a:endParaRPr kumimoji="1" lang="ja-JP" altLang="en-US" dirty="0"/>
           </a:p>
@@ -2464,7 +2469,7 @@
           </a:lstStyle>
           <a:p>
             <a:r>
-              <a:rPr lang="ja-JP" altLang="en-US" smtClean="0"/>
+              <a:rPr lang="ja-JP" altLang="en-US"/>
               <a:t>マスター タイトルの書式設定</a:t>
             </a:r>
             <a:endParaRPr lang="en-US" dirty="0"/>
@@ -2529,7 +2534,7 @@
           </a:lstStyle>
           <a:p>
             <a:r>
-              <a:rPr lang="ja-JP" altLang="en-US" dirty="0" smtClean="0"/>
+              <a:rPr lang="ja-JP" altLang="en-US" dirty="0"/>
               <a:t>図を追加</a:t>
             </a:r>
             <a:endParaRPr lang="en-US" dirty="0"/>
@@ -2595,7 +2600,7 @@
           <a:p>
             <a:pPr lvl="0"/>
             <a:r>
-              <a:rPr lang="ja-JP" altLang="en-US" smtClean="0"/>
+              <a:rPr lang="ja-JP" altLang="en-US"/>
               <a:t>マスター テキストの書式設定</a:t>
             </a:r>
           </a:p>
@@ -2618,7 +2623,7 @@
           <a:p>
             <a:fld id="{79A173A2-992D-4C10-B15F-B6CEAE468778}" type="datetimeFigureOut">
               <a:rPr kumimoji="1" lang="ja-JP" altLang="en-US" smtClean="0"/>
-              <a:t>2016/7/8</a:t>
+              <a:t>2017/5/30</a:t>
             </a:fld>
             <a:endParaRPr kumimoji="1" lang="ja-JP" altLang="en-US" dirty="0"/>
           </a:p>
@@ -2727,7 +2732,7 @@
           <a:lstStyle/>
           <a:p>
             <a:r>
-              <a:rPr lang="ja-JP" altLang="en-US" smtClean="0"/>
+              <a:rPr lang="ja-JP" altLang="en-US"/>
               <a:t>マスター タイトルの書式設定</a:t>
             </a:r>
             <a:endParaRPr lang="en-US" dirty="0"/>
@@ -2761,67 +2766,67 @@
           <a:p>
             <a:pPr lvl="0"/>
             <a:r>
-              <a:rPr lang="ja-JP" altLang="en-US" smtClean="0"/>
+              <a:rPr lang="ja-JP" altLang="en-US"/>
               <a:t>マスター テキストの書式設定</a:t>
             </a:r>
           </a:p>
           <a:p>
             <a:pPr lvl="1"/>
             <a:r>
-              <a:rPr lang="ja-JP" altLang="en-US" smtClean="0"/>
+              <a:rPr lang="ja-JP" altLang="en-US"/>
               <a:t>第 </a:t>
             </a:r>
             <a:r>
-              <a:rPr lang="en-US" altLang="ja-JP" smtClean="0"/>
+              <a:rPr lang="en-US" altLang="ja-JP"/>
               <a:t>2 </a:t>
             </a:r>
             <a:r>
-              <a:rPr lang="ja-JP" altLang="en-US" smtClean="0"/>
+              <a:rPr lang="ja-JP" altLang="en-US"/>
               <a:t>レベル</a:t>
             </a:r>
           </a:p>
           <a:p>
             <a:pPr lvl="2"/>
             <a:r>
-              <a:rPr lang="ja-JP" altLang="en-US" smtClean="0"/>
+              <a:rPr lang="ja-JP" altLang="en-US"/>
               <a:t>第 </a:t>
             </a:r>
             <a:r>
-              <a:rPr lang="en-US" altLang="ja-JP" smtClean="0"/>
+              <a:rPr lang="en-US" altLang="ja-JP"/>
               <a:t>3 </a:t>
             </a:r>
             <a:r>
-              <a:rPr lang="ja-JP" altLang="en-US" smtClean="0"/>
+              <a:rPr lang="ja-JP" altLang="en-US"/>
               <a:t>レベル</a:t>
             </a:r>
           </a:p>
           <a:p>
             <a:pPr lvl="3"/>
             <a:r>
-              <a:rPr lang="ja-JP" altLang="en-US" smtClean="0"/>
+              <a:rPr lang="ja-JP" altLang="en-US"/>
               <a:t>第 </a:t>
             </a:r>
             <a:r>
-              <a:rPr lang="en-US" altLang="ja-JP" smtClean="0"/>
+              <a:rPr lang="en-US" altLang="ja-JP"/>
               <a:t>4 </a:t>
             </a:r>
             <a:r>
-              <a:rPr lang="ja-JP" altLang="en-US" smtClean="0"/>
+              <a:rPr lang="ja-JP" altLang="en-US"/>
               <a:t>レベル</a:t>
             </a:r>
           </a:p>
           <a:p>
             <a:pPr lvl="4"/>
             <a:r>
-              <a:rPr lang="ja-JP" altLang="en-US" smtClean="0"/>
+              <a:rPr lang="ja-JP" altLang="en-US"/>
               <a:t>第 </a:t>
             </a:r>
             <a:r>
-              <a:rPr lang="en-US" altLang="ja-JP" smtClean="0"/>
+              <a:rPr lang="en-US" altLang="ja-JP"/>
               <a:t>5 </a:t>
             </a:r>
             <a:r>
-              <a:rPr lang="ja-JP" altLang="en-US" smtClean="0"/>
+              <a:rPr lang="ja-JP" altLang="en-US"/>
               <a:t>レベル</a:t>
             </a:r>
             <a:endParaRPr lang="en-US" dirty="0"/>
@@ -2863,7 +2868,7 @@
           <a:p>
             <a:fld id="{79A173A2-992D-4C10-B15F-B6CEAE468778}" type="datetimeFigureOut">
               <a:rPr kumimoji="1" lang="ja-JP" altLang="en-US" smtClean="0"/>
-              <a:t>2016/7/8</a:t>
+              <a:t>2017/5/30</a:t>
             </a:fld>
             <a:endParaRPr kumimoji="1" lang="ja-JP" altLang="en-US" dirty="0"/>
           </a:p>
@@ -3290,43 +3295,27 @@
           </a:bodyPr>
           <a:lstStyle/>
           <a:p>
-            <a:r>
-              <a:rPr kumimoji="1" lang="en-US" altLang="ja-JP" sz="4800" dirty="0" smtClean="0"/>
-              <a:t/>
-            </a:r>
             <a:br>
-              <a:rPr kumimoji="1" lang="en-US" altLang="ja-JP" sz="4800" dirty="0" smtClean="0"/>
+              <a:rPr kumimoji="1" lang="en-US" altLang="ja-JP" sz="4800" dirty="0"/>
             </a:br>
             <a:r>
-              <a:rPr kumimoji="1" lang="en-US" altLang="ja-JP" sz="4800" dirty="0" smtClean="0"/>
+              <a:rPr kumimoji="1" lang="en-US" altLang="ja-JP" sz="4800" dirty="0"/>
               <a:t>Information in </a:t>
             </a:r>
             <a:r>
-              <a:rPr kumimoji="1" lang="en-US" altLang="ja-JP" sz="4800" dirty="0" err="1" smtClean="0"/>
+              <a:rPr kumimoji="1" lang="en-US" altLang="ja-JP" sz="4800" dirty="0" err="1"/>
               <a:t>EventMetaData</a:t>
             </a:r>
             <a:r>
-              <a:rPr kumimoji="1" lang="en-US" altLang="ja-JP" sz="4800" dirty="0" smtClean="0"/>
+              <a:rPr kumimoji="1" lang="en-US" altLang="ja-JP" sz="4800" dirty="0"/>
               <a:t> </a:t>
-            </a:r>
-            <a:r>
-              <a:rPr lang="en-US" altLang="ja-JP" sz="4800" dirty="0"/>
-              <a:t/>
             </a:r>
             <a:br>
               <a:rPr lang="en-US" altLang="ja-JP" sz="4800" dirty="0"/>
             </a:br>
             <a:r>
-              <a:rPr lang="en-US" altLang="ja-JP" sz="4800" dirty="0" smtClean="0"/>
-              <a:t>and ‘Error </a:t>
-            </a:r>
-            <a:r>
               <a:rPr lang="en-US" altLang="ja-JP" sz="4800" dirty="0"/>
-              <a:t>event</a:t>
-            </a:r>
-            <a:r>
-              <a:rPr lang="en-US" altLang="ja-JP" sz="4800" dirty="0" smtClean="0"/>
-              <a:t>’</a:t>
+              <a:t>and ‘Error event’</a:t>
             </a:r>
             <a:endParaRPr kumimoji="1" lang="ja-JP" altLang="en-US" sz="4800" dirty="0"/>
           </a:p>
@@ -3353,7 +3342,7 @@
           <a:lstStyle/>
           <a:p>
             <a:r>
-              <a:rPr kumimoji="1" lang="en-US" altLang="ja-JP" dirty="0" smtClean="0"/>
+              <a:rPr kumimoji="1" lang="en-US" altLang="ja-JP" dirty="0"/>
               <a:t>S. Yamada (KEK)</a:t>
             </a:r>
             <a:endParaRPr kumimoji="1" lang="ja-JP" altLang="en-US" dirty="0"/>
@@ -3369,7 +3358,7 @@
         <p:spPr>
           <a:xfrm>
             <a:off x="6090716" y="6027312"/>
-            <a:ext cx="1239442" cy="369332"/>
+            <a:ext cx="1457963" cy="369332"/>
           </a:xfrm>
           <a:prstGeom prst="rect">
             <a:avLst/>
@@ -3383,8 +3372,8 @@
           <a:lstStyle/>
           <a:p>
             <a:r>
-              <a:rPr kumimoji="1" lang="en-US" altLang="ja-JP" dirty="0" smtClean="0"/>
-              <a:t>Jul. 1, 2016</a:t>
+              <a:rPr kumimoji="1" lang="en-US" altLang="ja-JP" dirty="0"/>
+              <a:t>May 30, 2017</a:t>
             </a:r>
             <a:endParaRPr kumimoji="1" lang="ja-JP" altLang="en-US" dirty="0"/>
           </a:p>
@@ -3413,44 +3402,28 @@
           <a:lstStyle/>
           <a:p>
             <a:r>
-              <a:rPr kumimoji="1" lang="en-US" altLang="ja-JP" sz="2400" dirty="0" smtClean="0"/>
+              <a:rPr kumimoji="1" lang="en-US" altLang="ja-JP" sz="2400" dirty="0"/>
               <a:t>1,  Storing data in </a:t>
             </a:r>
             <a:r>
-              <a:rPr kumimoji="1" lang="en-US" altLang="ja-JP" sz="2400" dirty="0" err="1" smtClean="0"/>
+              <a:rPr kumimoji="1" lang="en-US" altLang="ja-JP" sz="2400" dirty="0" err="1"/>
               <a:t>EventMetaData</a:t>
             </a:r>
             <a:r>
-              <a:rPr kumimoji="1" lang="en-US" altLang="ja-JP" sz="2400" dirty="0" smtClean="0"/>
+              <a:rPr kumimoji="1" lang="en-US" altLang="ja-JP" sz="2400" dirty="0"/>
               <a:t> object by online DAQ </a:t>
             </a:r>
           </a:p>
           <a:p>
             <a:r>
-              <a:rPr lang="en-US" altLang="ja-JP" sz="2400" dirty="0" smtClean="0"/>
-              <a:t>2</a:t>
-            </a:r>
-            <a:r>
               <a:rPr lang="en-US" altLang="ja-JP" sz="2400" dirty="0"/>
-              <a:t>,  Definition of ‘Error event’ and how to avoid the </a:t>
-            </a:r>
-            <a:r>
-              <a:rPr lang="en-US" altLang="ja-JP" sz="2400" dirty="0" smtClean="0"/>
-              <a:t>event</a:t>
-            </a:r>
-          </a:p>
-          <a:p>
-            <a:r>
-              <a:rPr lang="en-US" altLang="ja-JP" sz="2400" dirty="0" smtClean="0"/>
-              <a:t>2-1,  </a:t>
-            </a:r>
+              <a:t>2,  Definition of ‘Error event’ and how to avoid the event</a:t>
+            </a:r>
+          </a:p>
+          <a:p>
             <a:r>
               <a:rPr lang="en-US" altLang="ja-JP" sz="2400" dirty="0"/>
-              <a:t>Pocket DAQ </a:t>
-            </a:r>
-            <a:r>
-              <a:rPr lang="en-US" altLang="ja-JP" sz="2400" dirty="0" smtClean="0"/>
-              <a:t>case</a:t>
+              <a:t>2-1,  Pocket DAQ case</a:t>
             </a:r>
           </a:p>
         </p:txBody>
@@ -3507,7 +3480,7 @@
           <a:p>
             <a:pPr algn="ctr"/>
             <a:r>
-              <a:rPr kumimoji="1" lang="en-US" altLang="ja-JP" dirty="0" smtClean="0"/>
+              <a:rPr kumimoji="1" lang="en-US" altLang="ja-JP" dirty="0"/>
               <a:t>end</a:t>
             </a:r>
             <a:endParaRPr kumimoji="1" lang="ja-JP" altLang="en-US" dirty="0"/>
@@ -3518,6 +3491,101 @@
     <p:extLst>
       <p:ext uri="{BB962C8B-B14F-4D97-AF65-F5344CB8AC3E}">
         <p14:creationId xmlns:p14="http://schemas.microsoft.com/office/powerpoint/2010/main" val="1725309171"/>
+      </p:ext>
+    </p:extLst>
+  </p:cSld>
+  <p:clrMapOvr>
+    <a:masterClrMapping/>
+  </p:clrMapOvr>
+</p:sld>
+</file>
+
+<file path=ppt/slides/slide11.xml><?xml version="1.0" encoding="utf-8"?>
+<p:sld xmlns:a="http://schemas.openxmlformats.org/drawingml/2006/main" xmlns:r="http://schemas.openxmlformats.org/officeDocument/2006/relationships" xmlns:p="http://schemas.openxmlformats.org/presentationml/2006/main">
+  <p:cSld>
+    <p:spTree>
+      <p:nvGrpSpPr>
+        <p:cNvPr id="1" name=""/>
+        <p:cNvGrpSpPr/>
+        <p:nvPr/>
+      </p:nvGrpSpPr>
+      <p:grpSpPr>
+        <a:xfrm>
+          <a:off x="0" y="0"/>
+          <a:ext cx="0" cy="0"/>
+          <a:chOff x="0" y="0"/>
+          <a:chExt cx="0" cy="0"/>
+        </a:xfrm>
+      </p:grpSpPr>
+      <p:sp>
+        <p:nvSpPr>
+          <p:cNvPr id="2" name="タイトル 1"/>
+          <p:cNvSpPr>
+            <a:spLocks noGrp="1"/>
+          </p:cNvSpPr>
+          <p:nvPr>
+            <p:ph type="title"/>
+          </p:nvPr>
+        </p:nvSpPr>
+        <p:spPr/>
+        <p:txBody>
+          <a:bodyPr/>
+          <a:lstStyle/>
+          <a:p>
+            <a:r>
+              <a:rPr lang="en-US" altLang="ja-JP" dirty="0"/>
+              <a:t>Update history</a:t>
+            </a:r>
+            <a:endParaRPr kumimoji="1" lang="ja-JP" altLang="en-US" dirty="0"/>
+          </a:p>
+        </p:txBody>
+      </p:sp>
+      <p:sp>
+        <p:nvSpPr>
+          <p:cNvPr id="3" name="コンテンツ プレースホルダー 2"/>
+          <p:cNvSpPr>
+            <a:spLocks noGrp="1"/>
+          </p:cNvSpPr>
+          <p:nvPr>
+            <p:ph idx="1"/>
+          </p:nvPr>
+        </p:nvSpPr>
+        <p:spPr/>
+        <p:txBody>
+          <a:bodyPr/>
+          <a:lstStyle/>
+          <a:p>
+            <a:r>
+              <a:rPr kumimoji="1" lang="en-US" altLang="ja-JP" dirty="0"/>
+              <a:t>2017/5/30</a:t>
+            </a:r>
+          </a:p>
+          <a:p>
+            <a:pPr lvl="1"/>
+            <a:r>
+              <a:rPr lang="en-US" altLang="ja-JP" dirty="0"/>
+              <a:t>Change </a:t>
+            </a:r>
+            <a:r>
+              <a:rPr lang="en-US" altLang="ja-JP" dirty="0" err="1"/>
+              <a:t>enum</a:t>
+            </a:r>
+            <a:r>
+              <a:rPr lang="en-US" altLang="ja-JP" dirty="0"/>
+              <a:t> </a:t>
+            </a:r>
+            <a:r>
+              <a:rPr lang="en-US" altLang="ja-JP" dirty="0" err="1"/>
+              <a:t>EventErrorFlag</a:t>
+            </a:r>
+            <a:endParaRPr lang="en-US" altLang="ja-JP" dirty="0"/>
+          </a:p>
+        </p:txBody>
+      </p:sp>
+    </p:spTree>
+    <p:extLst>
+      <p:ext uri="{BB962C8B-B14F-4D97-AF65-F5344CB8AC3E}">
+        <p14:creationId xmlns:p14="http://schemas.microsoft.com/office/powerpoint/2010/main" val="3121981855"/>
       </p:ext>
     </p:extLst>
   </p:cSld>
@@ -3567,15 +3635,15 @@
           <a:lstStyle/>
           <a:p>
             <a:r>
-              <a:rPr kumimoji="1" lang="en-US" altLang="ja-JP" sz="3600" u="sng" dirty="0" smtClean="0"/>
+              <a:rPr kumimoji="1" lang="en-US" altLang="ja-JP" sz="3600" u="sng" dirty="0"/>
               <a:t>1,  Storing data in </a:t>
             </a:r>
             <a:r>
-              <a:rPr kumimoji="1" lang="en-US" altLang="ja-JP" sz="3600" u="sng" dirty="0" err="1" smtClean="0"/>
+              <a:rPr kumimoji="1" lang="en-US" altLang="ja-JP" sz="3600" u="sng" dirty="0" err="1"/>
               <a:t>EventMetaData</a:t>
             </a:r>
             <a:r>
-              <a:rPr kumimoji="1" lang="en-US" altLang="ja-JP" sz="3600" u="sng" dirty="0" smtClean="0"/>
+              <a:rPr kumimoji="1" lang="en-US" altLang="ja-JP" sz="3600" u="sng" dirty="0"/>
               <a:t> object by online DAQ </a:t>
             </a:r>
             <a:endParaRPr kumimoji="1" lang="ja-JP" altLang="en-US" sz="3600" u="sng" dirty="0"/>
@@ -3635,20 +3703,16 @@
           <a:lstStyle/>
           <a:p>
             <a:r>
-              <a:rPr kumimoji="1" lang="en-US" altLang="ja-JP" sz="1600" dirty="0" smtClean="0"/>
+              <a:rPr kumimoji="1" lang="en-US" altLang="ja-JP" sz="1600" dirty="0"/>
               <a:t>Red variables are supposed to be stored in </a:t>
             </a:r>
             <a:r>
-              <a:rPr lang="en-US" altLang="ja-JP" sz="1600" dirty="0" err="1" smtClean="0"/>
+              <a:rPr lang="en-US" altLang="ja-JP" sz="1600" dirty="0" err="1"/>
               <a:t>EventMetadata</a:t>
             </a:r>
             <a:r>
-              <a:rPr lang="en-US" altLang="ja-JP" sz="1600" dirty="0" smtClean="0"/>
-              <a:t> </a:t>
-            </a:r>
-            <a:r>
               <a:rPr lang="en-US" altLang="ja-JP" sz="1600" dirty="0"/>
-              <a:t>by </a:t>
+              <a:t> by </a:t>
             </a:r>
             <a:r>
               <a:rPr lang="en-US" altLang="ja-JP" sz="1600" dirty="0">
@@ -3659,15 +3723,15 @@
               <a:t>Raw2DsModule.cc </a:t>
             </a:r>
             <a:r>
-              <a:rPr lang="en-US" altLang="ja-JP" sz="1600" dirty="0" smtClean="0"/>
+              <a:rPr lang="en-US" altLang="ja-JP" sz="1600" dirty="0"/>
               <a:t>of</a:t>
             </a:r>
             <a:r>
-              <a:rPr kumimoji="1" lang="en-US" altLang="ja-JP" sz="1600" dirty="0" smtClean="0"/>
+              <a:rPr kumimoji="1" lang="en-US" altLang="ja-JP" sz="1600" dirty="0"/>
               <a:t> online DAQ program at </a:t>
             </a:r>
             <a:r>
-              <a:rPr kumimoji="1" lang="en-US" altLang="ja-JP" sz="1600" dirty="0" smtClean="0">
+              <a:rPr kumimoji="1" lang="en-US" altLang="ja-JP" sz="1600" dirty="0">
                 <a:solidFill>
                   <a:srgbClr val="0070C0"/>
                 </a:solidFill>
@@ -3675,7 +3739,7 @@
               <a:t>an HLT input server</a:t>
             </a:r>
             <a:r>
-              <a:rPr lang="en-US" altLang="ja-JP" sz="1600" dirty="0" smtClean="0">
+              <a:rPr lang="en-US" altLang="ja-JP" sz="1600" dirty="0">
                 <a:solidFill>
                   <a:srgbClr val="0070C0"/>
                 </a:solidFill>
@@ -3683,23 +3747,23 @@
               <a:t>. </a:t>
             </a:r>
             <a:r>
-              <a:rPr lang="en-US" altLang="ja-JP" sz="1600" dirty="0" smtClean="0"/>
+              <a:rPr lang="en-US" altLang="ja-JP" sz="1600" dirty="0"/>
               <a:t>Currently </a:t>
             </a:r>
             <a:r>
-              <a:rPr lang="en-US" altLang="ja-JP" sz="1600" dirty="0" err="1" smtClean="0"/>
+              <a:rPr lang="en-US" altLang="ja-JP" sz="1600" dirty="0" err="1"/>
               <a:t>m_time</a:t>
             </a:r>
             <a:r>
-              <a:rPr lang="en-US" altLang="ja-JP" sz="1600" dirty="0" smtClean="0"/>
+              <a:rPr lang="en-US" altLang="ja-JP" sz="1600" dirty="0"/>
               <a:t> and </a:t>
             </a:r>
             <a:r>
-              <a:rPr lang="en-US" altLang="ja-JP" sz="1600" dirty="0" err="1" smtClean="0"/>
+              <a:rPr lang="en-US" altLang="ja-JP" sz="1600" dirty="0" err="1"/>
               <a:t>m_production</a:t>
             </a:r>
             <a:r>
-              <a:rPr lang="en-US" altLang="ja-JP" sz="1600" dirty="0" smtClean="0"/>
+              <a:rPr lang="en-US" altLang="ja-JP" sz="1600" dirty="0"/>
               <a:t> are not filled yet.</a:t>
             </a:r>
             <a:endParaRPr kumimoji="1" lang="ja-JP" altLang="en-US" sz="1600" dirty="0"/>
@@ -3848,7 +3912,7 @@
           <a:lstStyle/>
           <a:p>
             <a:r>
-              <a:rPr lang="en-US" altLang="ja-JP" sz="1200" dirty="0" smtClean="0">
+              <a:rPr lang="en-US" altLang="ja-JP" sz="1200" dirty="0">
                 <a:solidFill>
                   <a:schemeClr val="tx1"/>
                 </a:solidFill>
@@ -3856,7 +3920,7 @@
               <a:t>Rev. 28703 (</a:t>
             </a:r>
             <a:r>
-              <a:rPr lang="en-US" altLang="ja-JP" sz="1200" dirty="0" smtClean="0">
+              <a:rPr lang="en-US" altLang="ja-JP" sz="1200" dirty="0">
                 <a:solidFill>
                   <a:schemeClr val="tx1"/>
                 </a:solidFill>
@@ -3865,7 +3929,7 @@
               <a:t>framework</a:t>
             </a:r>
             <a:r>
-              <a:rPr lang="en-US" altLang="ja-JP" sz="1200" dirty="0" smtClean="0">
+              <a:rPr lang="en-US" altLang="ja-JP" sz="1200" dirty="0">
                 <a:solidFill>
                   <a:schemeClr val="tx1"/>
                 </a:solidFill>
@@ -3873,7 +3937,7 @@
               <a:t>/</a:t>
             </a:r>
             <a:r>
-              <a:rPr lang="en-US" altLang="ja-JP" sz="1200" dirty="0" err="1" smtClean="0">
+              <a:rPr lang="en-US" altLang="ja-JP" sz="1200" dirty="0" err="1">
                 <a:solidFill>
                   <a:schemeClr val="tx1"/>
                 </a:solidFill>
@@ -3882,7 +3946,7 @@
               <a:t>dataobjects</a:t>
             </a:r>
             <a:r>
-              <a:rPr lang="en-US" altLang="ja-JP" sz="1200" dirty="0" smtClean="0">
+              <a:rPr lang="en-US" altLang="ja-JP" sz="1200" dirty="0">
                 <a:solidFill>
                   <a:schemeClr val="tx1"/>
                 </a:solidFill>
@@ -3890,7 +3954,7 @@
               <a:t>/</a:t>
             </a:r>
             <a:r>
-              <a:rPr lang="en-US" altLang="ja-JP" sz="1200" dirty="0" smtClean="0">
+              <a:rPr lang="en-US" altLang="ja-JP" sz="1200" dirty="0">
                 <a:solidFill>
                   <a:schemeClr val="tx1"/>
                 </a:solidFill>
@@ -3899,7 +3963,7 @@
               <a:t>include</a:t>
             </a:r>
             <a:r>
-              <a:rPr lang="en-US" altLang="ja-JP" sz="1200" dirty="0" smtClean="0">
+              <a:rPr lang="en-US" altLang="ja-JP" sz="1200" dirty="0">
                 <a:solidFill>
                   <a:schemeClr val="tx1"/>
                 </a:solidFill>
@@ -3907,7 +3971,7 @@
               <a:t>/</a:t>
             </a:r>
             <a:r>
-              <a:rPr lang="en-US" altLang="ja-JP" sz="1200" dirty="0" err="1" smtClean="0">
+              <a:rPr lang="en-US" altLang="ja-JP" sz="1200" dirty="0" err="1">
                 <a:solidFill>
                   <a:schemeClr val="tx1"/>
                 </a:solidFill>
@@ -3916,7 +3980,7 @@
               <a:t>EventMetaData.h</a:t>
             </a:r>
             <a:r>
-              <a:rPr lang="en-US" altLang="ja-JP" sz="1200" dirty="0" smtClean="0">
+              <a:rPr lang="en-US" altLang="ja-JP" sz="1200" dirty="0">
                 <a:solidFill>
                   <a:schemeClr val="tx1"/>
                 </a:solidFill>
@@ -3926,7 +3990,7 @@
           </a:p>
           <a:p>
             <a:r>
-              <a:rPr lang="en-US" altLang="ja-JP" sz="1200" dirty="0" smtClean="0">
+              <a:rPr lang="en-US" altLang="ja-JP" sz="1200" dirty="0">
                 <a:solidFill>
                   <a:schemeClr val="tx1"/>
                 </a:solidFill>
@@ -3936,7 +4000,7 @@
           </a:p>
           <a:p>
             <a:r>
-              <a:rPr lang="en-US" altLang="ja-JP" sz="1200" dirty="0" smtClean="0">
+              <a:rPr lang="en-US" altLang="ja-JP" sz="1200" dirty="0">
                 <a:solidFill>
                   <a:schemeClr val="tx1"/>
                 </a:solidFill>
@@ -3946,7 +4010,7 @@
           </a:p>
           <a:p>
             <a:r>
-              <a:rPr lang="en-US" altLang="ja-JP" sz="1200" dirty="0" smtClean="0">
+              <a:rPr lang="en-US" altLang="ja-JP" sz="1200" dirty="0">
                 <a:solidFill>
                   <a:srgbClr val="FF0000"/>
                 </a:solidFill>
@@ -3954,7 +4018,7 @@
               <a:t>unsigned </a:t>
             </a:r>
             <a:r>
-              <a:rPr lang="en-US" altLang="ja-JP" sz="1200" dirty="0" err="1" smtClean="0">
+              <a:rPr lang="en-US" altLang="ja-JP" sz="1200" dirty="0" err="1">
                 <a:solidFill>
                   <a:srgbClr val="FF0000"/>
                 </a:solidFill>
@@ -3962,7 +4026,7 @@
               <a:t>int</a:t>
             </a:r>
             <a:r>
-              <a:rPr lang="en-US" altLang="ja-JP" sz="1200" dirty="0" smtClean="0">
+              <a:rPr lang="en-US" altLang="ja-JP" sz="1200" dirty="0">
                 <a:solidFill>
                   <a:srgbClr val="FF0000"/>
                 </a:solidFill>
@@ -3970,7 +4034,7 @@
               <a:t> </a:t>
             </a:r>
             <a:r>
-              <a:rPr lang="en-US" altLang="ja-JP" sz="1200" dirty="0" err="1" smtClean="0">
+              <a:rPr lang="en-US" altLang="ja-JP" sz="1200" dirty="0" err="1">
                 <a:solidFill>
                   <a:srgbClr val="FF0000"/>
                 </a:solidFill>
@@ -3978,7 +4042,7 @@
               <a:t>m_event</a:t>
             </a:r>
             <a:r>
-              <a:rPr lang="en-US" altLang="ja-JP" sz="1200" dirty="0" smtClean="0">
+              <a:rPr lang="en-US" altLang="ja-JP" sz="1200" dirty="0">
                 <a:solidFill>
                   <a:srgbClr val="FF0000"/>
                 </a:solidFill>
@@ -3986,7 +4050,7 @@
               <a:t>; </a:t>
             </a:r>
             <a:r>
-              <a:rPr lang="en-US" altLang="ja-JP" sz="1200" dirty="0" smtClean="0">
+              <a:rPr lang="en-US" altLang="ja-JP" sz="1200" dirty="0">
                 <a:solidFill>
                   <a:schemeClr val="tx1"/>
                 </a:solidFill>
@@ -3996,7 +4060,7 @@
           </a:p>
           <a:p>
             <a:r>
-              <a:rPr lang="en-US" altLang="ja-JP" sz="1200" dirty="0" err="1" smtClean="0">
+              <a:rPr lang="en-US" altLang="ja-JP" sz="1200" dirty="0" err="1">
                 <a:solidFill>
                   <a:srgbClr val="FF0000"/>
                 </a:solidFill>
@@ -4004,7 +4068,7 @@
               <a:t>int</a:t>
             </a:r>
             <a:r>
-              <a:rPr lang="en-US" altLang="ja-JP" sz="1200" dirty="0" smtClean="0">
+              <a:rPr lang="en-US" altLang="ja-JP" sz="1200" dirty="0">
                 <a:solidFill>
                   <a:srgbClr val="FF0000"/>
                 </a:solidFill>
@@ -4012,7 +4076,7 @@
               <a:t> </a:t>
             </a:r>
             <a:r>
-              <a:rPr lang="en-US" altLang="ja-JP" sz="1200" dirty="0" err="1" smtClean="0">
+              <a:rPr lang="en-US" altLang="ja-JP" sz="1200" dirty="0" err="1">
                 <a:solidFill>
                   <a:srgbClr val="FF0000"/>
                 </a:solidFill>
@@ -4020,7 +4084,7 @@
               <a:t>m_run</a:t>
             </a:r>
             <a:r>
-              <a:rPr lang="en-US" altLang="ja-JP" sz="1200" dirty="0" smtClean="0">
+              <a:rPr lang="en-US" altLang="ja-JP" sz="1200" dirty="0">
                 <a:solidFill>
                   <a:srgbClr val="FF0000"/>
                 </a:solidFill>
@@ -4028,7 +4092,7 @@
               <a:t>; </a:t>
             </a:r>
             <a:r>
-              <a:rPr lang="en-US" altLang="ja-JP" sz="1200" dirty="0" smtClean="0">
+              <a:rPr lang="en-US" altLang="ja-JP" sz="1200" dirty="0">
                 <a:solidFill>
                   <a:schemeClr val="tx1"/>
                 </a:solidFill>
@@ -4038,7 +4102,7 @@
           </a:p>
           <a:p>
             <a:r>
-              <a:rPr lang="en-US" altLang="ja-JP" sz="1200" dirty="0" err="1" smtClean="0">
+              <a:rPr lang="en-US" altLang="ja-JP" sz="1200" dirty="0" err="1">
                 <a:solidFill>
                   <a:srgbClr val="FF0000"/>
                 </a:solidFill>
@@ -4046,7 +4110,7 @@
               <a:t>int</a:t>
             </a:r>
             <a:r>
-              <a:rPr lang="en-US" altLang="ja-JP" sz="1200" dirty="0" smtClean="0">
+              <a:rPr lang="en-US" altLang="ja-JP" sz="1200" dirty="0">
                 <a:solidFill>
                   <a:srgbClr val="FF0000"/>
                 </a:solidFill>
@@ -4054,7 +4118,7 @@
               <a:t> </a:t>
             </a:r>
             <a:r>
-              <a:rPr lang="en-US" altLang="ja-JP" sz="1200" dirty="0" err="1" smtClean="0">
+              <a:rPr lang="en-US" altLang="ja-JP" sz="1200" dirty="0" err="1">
                 <a:solidFill>
                   <a:srgbClr val="FF0000"/>
                 </a:solidFill>
@@ -4062,7 +4126,7 @@
               <a:t>m_subrun</a:t>
             </a:r>
             <a:r>
-              <a:rPr lang="en-US" altLang="ja-JP" sz="1200" dirty="0" smtClean="0">
+              <a:rPr lang="en-US" altLang="ja-JP" sz="1200" dirty="0">
                 <a:solidFill>
                   <a:srgbClr val="FF0000"/>
                 </a:solidFill>
@@ -4070,7 +4134,7 @@
               <a:t>; </a:t>
             </a:r>
             <a:r>
-              <a:rPr lang="en-US" altLang="ja-JP" sz="1200" dirty="0" smtClean="0">
+              <a:rPr lang="en-US" altLang="ja-JP" sz="1200" dirty="0">
                 <a:solidFill>
                   <a:schemeClr val="tx1"/>
                 </a:solidFill>
@@ -4080,7 +4144,7 @@
           </a:p>
           <a:p>
             <a:r>
-              <a:rPr lang="en-US" altLang="ja-JP" sz="1200" dirty="0" err="1" smtClean="0">
+              <a:rPr lang="en-US" altLang="ja-JP" sz="1200" dirty="0" err="1">
                 <a:solidFill>
                   <a:srgbClr val="FF0000"/>
                 </a:solidFill>
@@ -4088,7 +4152,7 @@
               <a:t>int</a:t>
             </a:r>
             <a:r>
-              <a:rPr lang="en-US" altLang="ja-JP" sz="1200" dirty="0" smtClean="0">
+              <a:rPr lang="en-US" altLang="ja-JP" sz="1200" dirty="0">
                 <a:solidFill>
                   <a:srgbClr val="FF0000"/>
                 </a:solidFill>
@@ -4096,7 +4160,7 @@
               <a:t> </a:t>
             </a:r>
             <a:r>
-              <a:rPr lang="en-US" altLang="ja-JP" sz="1200" dirty="0" err="1" smtClean="0">
+              <a:rPr lang="en-US" altLang="ja-JP" sz="1200" dirty="0" err="1">
                 <a:solidFill>
                   <a:srgbClr val="FF0000"/>
                 </a:solidFill>
@@ -4104,7 +4168,7 @@
               <a:t>m_experiment</a:t>
             </a:r>
             <a:r>
-              <a:rPr lang="en-US" altLang="ja-JP" sz="1200" dirty="0" smtClean="0">
+              <a:rPr lang="en-US" altLang="ja-JP" sz="1200" dirty="0">
                 <a:solidFill>
                   <a:srgbClr val="FF0000"/>
                 </a:solidFill>
@@ -4112,7 +4176,7 @@
               <a:t>; </a:t>
             </a:r>
             <a:r>
-              <a:rPr lang="en-US" altLang="ja-JP" sz="1200" dirty="0" smtClean="0">
+              <a:rPr lang="en-US" altLang="ja-JP" sz="1200" dirty="0">
                 <a:solidFill>
                   <a:schemeClr val="tx1"/>
                 </a:solidFill>
@@ -4120,7 +4184,7 @@
               <a:t>/**&lt; Experiment number. (valid values: [0, 1023], run-independent MC has </a:t>
             </a:r>
             <a:r>
-              <a:rPr lang="en-US" altLang="ja-JP" sz="1200" dirty="0" err="1" smtClean="0">
+              <a:rPr lang="en-US" altLang="ja-JP" sz="1200" dirty="0" err="1">
                 <a:solidFill>
                   <a:schemeClr val="tx1"/>
                 </a:solidFill>
@@ -4128,7 +4192,7 @@
               <a:t>exp</a:t>
             </a:r>
             <a:r>
-              <a:rPr lang="en-US" altLang="ja-JP" sz="1200" dirty="0" smtClean="0">
+              <a:rPr lang="en-US" altLang="ja-JP" sz="1200" dirty="0">
                 <a:solidFill>
                   <a:schemeClr val="tx1"/>
                 </a:solidFill>
@@ -4138,7 +4202,7 @@
           </a:p>
           <a:p>
             <a:r>
-              <a:rPr lang="en-US" altLang="ja-JP" sz="1200" dirty="0" err="1" smtClean="0">
+              <a:rPr lang="en-US" altLang="ja-JP" sz="1200" dirty="0" err="1">
                 <a:solidFill>
                   <a:srgbClr val="FF0000"/>
                 </a:solidFill>
@@ -4146,7 +4210,7 @@
               <a:t>int</a:t>
             </a:r>
             <a:r>
-              <a:rPr lang="en-US" altLang="ja-JP" sz="1200" dirty="0" smtClean="0">
+              <a:rPr lang="en-US" altLang="ja-JP" sz="1200" dirty="0">
                 <a:solidFill>
                   <a:srgbClr val="FF0000"/>
                 </a:solidFill>
@@ -4154,7 +4218,7 @@
               <a:t> </a:t>
             </a:r>
             <a:r>
-              <a:rPr lang="en-US" altLang="ja-JP" sz="1200" dirty="0" err="1" smtClean="0">
+              <a:rPr lang="en-US" altLang="ja-JP" sz="1200" dirty="0" err="1">
                 <a:solidFill>
                   <a:srgbClr val="FF0000"/>
                 </a:solidFill>
@@ -4162,7 +4226,7 @@
               <a:t>m_production</a:t>
             </a:r>
             <a:r>
-              <a:rPr lang="en-US" altLang="ja-JP" sz="1200" dirty="0" smtClean="0">
+              <a:rPr lang="en-US" altLang="ja-JP" sz="1200" dirty="0">
                 <a:solidFill>
                   <a:srgbClr val="FF0000"/>
                 </a:solidFill>
@@ -4170,7 +4234,7 @@
               <a:t>; </a:t>
             </a:r>
             <a:r>
-              <a:rPr lang="en-US" altLang="ja-JP" sz="1200" dirty="0" smtClean="0">
+              <a:rPr lang="en-US" altLang="ja-JP" sz="1200" dirty="0">
                 <a:solidFill>
                   <a:schemeClr val="tx1"/>
                 </a:solidFill>
@@ -4180,7 +4244,7 @@
           </a:p>
           <a:p>
             <a:r>
-              <a:rPr lang="en-US" altLang="ja-JP" sz="1200" dirty="0" smtClean="0">
+              <a:rPr lang="en-US" altLang="ja-JP" sz="1200" dirty="0">
                 <a:solidFill>
                   <a:srgbClr val="FF0000"/>
                 </a:solidFill>
@@ -4188,7 +4252,7 @@
               <a:t>unsigned long </a:t>
             </a:r>
             <a:r>
-              <a:rPr lang="en-US" altLang="ja-JP" sz="1200" dirty="0" err="1" smtClean="0">
+              <a:rPr lang="en-US" altLang="ja-JP" sz="1200" dirty="0" err="1">
                 <a:solidFill>
                   <a:srgbClr val="FF0000"/>
                 </a:solidFill>
@@ -4196,7 +4260,7 @@
               <a:t>long</a:t>
             </a:r>
             <a:r>
-              <a:rPr lang="en-US" altLang="ja-JP" sz="1200" dirty="0" smtClean="0">
+              <a:rPr lang="en-US" altLang="ja-JP" sz="1200" dirty="0">
                 <a:solidFill>
                   <a:srgbClr val="FF0000"/>
                 </a:solidFill>
@@ -4204,7 +4268,7 @@
               <a:t> </a:t>
             </a:r>
             <a:r>
-              <a:rPr lang="en-US" altLang="ja-JP" sz="1200" dirty="0" err="1" smtClean="0">
+              <a:rPr lang="en-US" altLang="ja-JP" sz="1200" dirty="0" err="1">
                 <a:solidFill>
                   <a:srgbClr val="FF0000"/>
                 </a:solidFill>
@@ -4212,7 +4276,7 @@
               <a:t>int</a:t>
             </a:r>
             <a:r>
-              <a:rPr lang="en-US" altLang="ja-JP" sz="1200" dirty="0" smtClean="0">
+              <a:rPr lang="en-US" altLang="ja-JP" sz="1200" dirty="0">
                 <a:solidFill>
                   <a:srgbClr val="FF0000"/>
                 </a:solidFill>
@@ -4220,7 +4284,7 @@
               <a:t> </a:t>
             </a:r>
             <a:r>
-              <a:rPr lang="en-US" altLang="ja-JP" sz="1200" dirty="0" err="1" smtClean="0">
+              <a:rPr lang="en-US" altLang="ja-JP" sz="1200" dirty="0" err="1">
                 <a:solidFill>
                   <a:srgbClr val="FF0000"/>
                 </a:solidFill>
@@ -4228,7 +4292,7 @@
               <a:t>m_time</a:t>
             </a:r>
             <a:r>
-              <a:rPr lang="en-US" altLang="ja-JP" sz="1200" dirty="0" smtClean="0">
+              <a:rPr lang="en-US" altLang="ja-JP" sz="1200" dirty="0">
                 <a:solidFill>
                   <a:srgbClr val="FF0000"/>
                 </a:solidFill>
@@ -4236,7 +4300,7 @@
               <a:t>; </a:t>
             </a:r>
             <a:r>
-              <a:rPr lang="en-US" altLang="ja-JP" sz="1200" dirty="0" smtClean="0">
+              <a:rPr lang="en-US" altLang="ja-JP" sz="1200" dirty="0">
                 <a:solidFill>
                   <a:schemeClr val="tx1"/>
                 </a:solidFill>
@@ -4246,7 +4310,7 @@
           </a:p>
           <a:p>
             <a:r>
-              <a:rPr lang="en-US" altLang="ja-JP" sz="1200" dirty="0" err="1" smtClean="0">
+              <a:rPr lang="en-US" altLang="ja-JP" sz="1200" dirty="0" err="1">
                 <a:solidFill>
                   <a:schemeClr val="tx1"/>
                 </a:solidFill>
@@ -4254,7 +4318,7 @@
               <a:t>std</a:t>
             </a:r>
             <a:r>
-              <a:rPr lang="en-US" altLang="ja-JP" sz="1200" dirty="0" smtClean="0">
+              <a:rPr lang="en-US" altLang="ja-JP" sz="1200" dirty="0">
                 <a:solidFill>
                   <a:schemeClr val="tx1"/>
                 </a:solidFill>
@@ -4262,7 +4326,7 @@
               <a:t>::string </a:t>
             </a:r>
             <a:r>
-              <a:rPr lang="en-US" altLang="ja-JP" sz="1200" dirty="0" err="1" smtClean="0">
+              <a:rPr lang="en-US" altLang="ja-JP" sz="1200" dirty="0" err="1">
                 <a:solidFill>
                   <a:schemeClr val="tx1"/>
                 </a:solidFill>
@@ -4270,7 +4334,7 @@
               <a:t>m_parentLfn</a:t>
             </a:r>
             <a:r>
-              <a:rPr lang="en-US" altLang="ja-JP" sz="1200" dirty="0" smtClean="0">
+              <a:rPr lang="en-US" altLang="ja-JP" sz="1200" dirty="0">
                 <a:solidFill>
                   <a:schemeClr val="tx1"/>
                 </a:solidFill>
@@ -4278,7 +4342,7 @@
               <a:t>;  /**&lt; </a:t>
             </a:r>
             <a:r>
-              <a:rPr lang="en-US" altLang="ja-JP" sz="1200" dirty="0" err="1" smtClean="0">
+              <a:rPr lang="en-US" altLang="ja-JP" sz="1200" dirty="0" err="1">
                 <a:solidFill>
                   <a:schemeClr val="tx1"/>
                 </a:solidFill>
@@ -4286,7 +4350,7 @@
               <a:t>LFN</a:t>
             </a:r>
             <a:r>
-              <a:rPr lang="en-US" altLang="ja-JP" sz="1200" dirty="0" smtClean="0">
+              <a:rPr lang="en-US" altLang="ja-JP" sz="1200" dirty="0">
                 <a:solidFill>
                   <a:schemeClr val="tx1"/>
                 </a:solidFill>
@@ -4296,7 +4360,7 @@
           </a:p>
           <a:p>
             <a:r>
-              <a:rPr lang="en-US" altLang="ja-JP" sz="1200" dirty="0" smtClean="0">
+              <a:rPr lang="en-US" altLang="ja-JP" sz="1200" dirty="0">
                 <a:solidFill>
                   <a:schemeClr val="tx1"/>
                 </a:solidFill>
@@ -4304,7 +4368,7 @@
               <a:t>double </a:t>
             </a:r>
             <a:r>
-              <a:rPr lang="en-US" altLang="ja-JP" sz="1200" dirty="0" err="1" smtClean="0">
+              <a:rPr lang="en-US" altLang="ja-JP" sz="1200" dirty="0" err="1">
                 <a:solidFill>
                   <a:schemeClr val="tx1"/>
                 </a:solidFill>
@@ -4312,7 +4376,7 @@
               <a:t>m_generatedWeight</a:t>
             </a:r>
             <a:r>
-              <a:rPr lang="en-US" altLang="ja-JP" sz="1200" dirty="0" smtClean="0">
+              <a:rPr lang="en-US" altLang="ja-JP" sz="1200" dirty="0">
                 <a:solidFill>
                   <a:schemeClr val="tx1"/>
                 </a:solidFill>
@@ -4322,7 +4386,7 @@
           </a:p>
           <a:p>
             <a:r>
-              <a:rPr lang="en-US" altLang="ja-JP" sz="1200" dirty="0" smtClean="0">
+              <a:rPr lang="en-US" altLang="ja-JP" sz="1200" dirty="0">
                 <a:solidFill>
                   <a:srgbClr val="FF0000"/>
                 </a:solidFill>
@@ -4330,7 +4394,7 @@
               <a:t>unsigned </a:t>
             </a:r>
             <a:r>
-              <a:rPr lang="en-US" altLang="ja-JP" sz="1200" dirty="0" err="1" smtClean="0">
+              <a:rPr lang="en-US" altLang="ja-JP" sz="1200" dirty="0" err="1">
                 <a:solidFill>
                   <a:srgbClr val="FF0000"/>
                 </a:solidFill>
@@ -4338,7 +4402,7 @@
               <a:t>int</a:t>
             </a:r>
             <a:r>
-              <a:rPr lang="en-US" altLang="ja-JP" sz="1200" dirty="0" smtClean="0">
+              <a:rPr lang="en-US" altLang="ja-JP" sz="1200" dirty="0">
                 <a:solidFill>
                   <a:srgbClr val="FF0000"/>
                 </a:solidFill>
@@ -4346,7 +4410,7 @@
               <a:t> </a:t>
             </a:r>
             <a:r>
-              <a:rPr lang="en-US" altLang="ja-JP" sz="1200" dirty="0" err="1" smtClean="0">
+              <a:rPr lang="en-US" altLang="ja-JP" sz="1200" dirty="0" err="1">
                 <a:solidFill>
                   <a:srgbClr val="FF0000"/>
                 </a:solidFill>
@@ -4354,7 +4418,7 @@
               <a:t>m_errorFlag</a:t>
             </a:r>
             <a:r>
-              <a:rPr lang="en-US" altLang="ja-JP" sz="1200" dirty="0" smtClean="0">
+              <a:rPr lang="en-US" altLang="ja-JP" sz="1200" dirty="0">
                 <a:solidFill>
                   <a:srgbClr val="FF0000"/>
                 </a:solidFill>
@@ -4362,7 +4426,7 @@
               <a:t>;  </a:t>
             </a:r>
             <a:r>
-              <a:rPr lang="en-US" altLang="ja-JP" sz="1200" dirty="0" smtClean="0">
+              <a:rPr lang="en-US" altLang="ja-JP" sz="1200" dirty="0">
                 <a:solidFill>
                   <a:schemeClr val="tx1"/>
                 </a:solidFill>
@@ -4370,7 +4434,7 @@
               <a:t>/**&lt; Indicator of error conditions during data taking, </a:t>
             </a:r>
             <a:r>
-              <a:rPr lang="en-US" altLang="ja-JP" sz="1200" dirty="0" err="1" smtClean="0">
+              <a:rPr lang="en-US" altLang="ja-JP" sz="1200" dirty="0" err="1">
                 <a:solidFill>
                   <a:schemeClr val="tx1"/>
                 </a:solidFill>
@@ -4378,7 +4442,7 @@
               <a:t>ORed</a:t>
             </a:r>
             <a:r>
-              <a:rPr lang="en-US" altLang="ja-JP" sz="1200" dirty="0" smtClean="0">
+              <a:rPr lang="en-US" altLang="ja-JP" sz="1200" dirty="0">
                 <a:solidFill>
                   <a:schemeClr val="tx1"/>
                 </a:solidFill>
@@ -4386,7 +4450,7 @@
               <a:t> combination of </a:t>
             </a:r>
             <a:r>
-              <a:rPr lang="en-US" altLang="ja-JP" sz="1200" dirty="0" err="1" smtClean="0">
+              <a:rPr lang="en-US" altLang="ja-JP" sz="1200" dirty="0" err="1">
                 <a:solidFill>
                   <a:schemeClr val="tx1"/>
                 </a:solidFill>
@@ -4394,7 +4458,7 @@
               <a:t>EventErrorFlag</a:t>
             </a:r>
             <a:r>
-              <a:rPr lang="en-US" altLang="ja-JP" sz="1200" dirty="0" smtClean="0">
+              <a:rPr lang="en-US" altLang="ja-JP" sz="1200" dirty="0">
                 <a:solidFill>
                   <a:schemeClr val="tx1"/>
                 </a:solidFill>
@@ -4427,11 +4491,11 @@
           <a:lstStyle/>
           <a:p>
             <a:r>
-              <a:rPr kumimoji="1" lang="en-US" altLang="ja-JP" u="sng" dirty="0" smtClean="0"/>
+              <a:rPr kumimoji="1" lang="en-US" altLang="ja-JP" u="sng" dirty="0"/>
               <a:t>Member variables of </a:t>
             </a:r>
             <a:r>
-              <a:rPr kumimoji="1" lang="en-US" altLang="ja-JP" u="sng" dirty="0" err="1" smtClean="0"/>
+              <a:rPr kumimoji="1" lang="en-US" altLang="ja-JP" u="sng" dirty="0" err="1"/>
               <a:t>EventMetaData</a:t>
             </a:r>
             <a:endParaRPr kumimoji="1" lang="ja-JP" altLang="en-US" u="sng" dirty="0"/>
@@ -4490,7 +4554,7 @@
           <a:lstStyle/>
           <a:p>
             <a:r>
-              <a:rPr lang="en-US" altLang="ja-JP" sz="2000" u="sng" dirty="0" smtClean="0"/>
+              <a:rPr lang="en-US" altLang="ja-JP" sz="2000" u="sng" dirty="0"/>
               <a:t>What daq/rfarm/event/modules/src/Raw2DsModule.cc is doing : </a:t>
             </a:r>
             <a:endParaRPr lang="ja-JP" altLang="en-US" sz="2000" u="sng" dirty="0"/>
@@ -4524,23 +4588,23 @@
           <a:lstStyle/>
           <a:p>
             <a:r>
-              <a:rPr lang="en-US" altLang="ja-JP" sz="1600" dirty="0" smtClean="0"/>
+              <a:rPr lang="en-US" altLang="ja-JP" sz="1600" dirty="0"/>
               <a:t>  </a:t>
             </a:r>
             <a:r>
-              <a:rPr lang="en-US" altLang="ja-JP" sz="1600" dirty="0" err="1" smtClean="0"/>
+              <a:rPr lang="en-US" altLang="ja-JP" sz="1600" dirty="0" err="1"/>
               <a:t>evtmetadata</a:t>
             </a:r>
             <a:r>
-              <a:rPr lang="en-US" altLang="ja-JP" sz="1600" dirty="0" smtClean="0"/>
+              <a:rPr lang="en-US" altLang="ja-JP" sz="1600" dirty="0"/>
               <a:t>-&gt;</a:t>
             </a:r>
             <a:r>
-              <a:rPr lang="en-US" altLang="ja-JP" sz="1600" dirty="0" err="1" smtClean="0"/>
+              <a:rPr lang="en-US" altLang="ja-JP" sz="1600" dirty="0" err="1"/>
               <a:t>set</a:t>
             </a:r>
             <a:r>
-              <a:rPr lang="en-US" altLang="ja-JP" sz="1600" dirty="0" err="1" smtClean="0">
+              <a:rPr lang="en-US" altLang="ja-JP" sz="1600" dirty="0" err="1">
                 <a:solidFill>
                   <a:srgbClr val="00B0F0"/>
                 </a:solidFill>
@@ -4548,19 +4612,19 @@
               <a:t>Experiment</a:t>
             </a:r>
             <a:r>
-              <a:rPr lang="en-US" altLang="ja-JP" sz="1600" dirty="0" smtClean="0"/>
+              <a:rPr lang="en-US" altLang="ja-JP" sz="1600" dirty="0"/>
               <a:t>(</a:t>
             </a:r>
             <a:r>
-              <a:rPr lang="en-US" altLang="ja-JP" sz="1600" dirty="0" err="1" smtClean="0"/>
+              <a:rPr lang="en-US" altLang="ja-JP" sz="1600" dirty="0" err="1"/>
               <a:t>sndhdr.GetExpNum</a:t>
             </a:r>
             <a:r>
-              <a:rPr lang="en-US" altLang="ja-JP" sz="1600" dirty="0" smtClean="0"/>
+              <a:rPr lang="en-US" altLang="ja-JP" sz="1600" dirty="0"/>
               <a:t>());</a:t>
             </a:r>
             <a:r>
-              <a:rPr lang="en-US" altLang="ja-JP" sz="1600" dirty="0" smtClean="0">
+              <a:rPr lang="en-US" altLang="ja-JP" sz="1600" dirty="0">
                 <a:solidFill>
                   <a:srgbClr val="FF0000"/>
                 </a:solidFill>
@@ -4568,38 +4632,38 @@
               <a:t> </a:t>
             </a:r>
             <a:r>
-              <a:rPr lang="en-US" altLang="ja-JP" sz="1600" dirty="0" smtClean="0"/>
+              <a:rPr lang="en-US" altLang="ja-JP" sz="1600" dirty="0"/>
               <a:t>// -&gt; Added at </a:t>
             </a:r>
             <a:r>
-              <a:rPr lang="en-US" altLang="ja-JP" sz="1600" dirty="0" smtClean="0">
+              <a:rPr lang="en-US" altLang="ja-JP" sz="1600" dirty="0">
                 <a:solidFill>
                   <a:srgbClr val="FF0000"/>
                 </a:solidFill>
               </a:rPr>
               <a:t>rev. 8338</a:t>
             </a:r>
-            <a:endParaRPr lang="en-US" altLang="ja-JP" sz="1600" dirty="0" smtClean="0"/>
-          </a:p>
-          <a:p>
-            <a:r>
-              <a:rPr lang="en-US" altLang="ja-JP" sz="1600" dirty="0" smtClean="0"/>
+            <a:endParaRPr lang="en-US" altLang="ja-JP" sz="1600" dirty="0"/>
+          </a:p>
+          <a:p>
+            <a:r>
+              <a:rPr lang="en-US" altLang="ja-JP" sz="1600" dirty="0"/>
               <a:t>  </a:t>
             </a:r>
             <a:r>
-              <a:rPr lang="en-US" altLang="ja-JP" sz="1600" dirty="0" err="1" smtClean="0"/>
+              <a:rPr lang="en-US" altLang="ja-JP" sz="1600" dirty="0" err="1"/>
               <a:t>evtmetadata</a:t>
             </a:r>
             <a:r>
-              <a:rPr lang="en-US" altLang="ja-JP" sz="1600" dirty="0" smtClean="0"/>
+              <a:rPr lang="en-US" altLang="ja-JP" sz="1600" dirty="0"/>
               <a:t>-&gt;</a:t>
             </a:r>
             <a:r>
-              <a:rPr lang="en-US" altLang="ja-JP" sz="1600" dirty="0" err="1" smtClean="0"/>
+              <a:rPr lang="en-US" altLang="ja-JP" sz="1600" dirty="0" err="1"/>
               <a:t>set</a:t>
             </a:r>
             <a:r>
-              <a:rPr lang="en-US" altLang="ja-JP" sz="1600" dirty="0" err="1" smtClean="0">
+              <a:rPr lang="en-US" altLang="ja-JP" sz="1600" dirty="0" err="1">
                 <a:solidFill>
                   <a:srgbClr val="00B0F0"/>
                 </a:solidFill>
@@ -4607,50 +4671,46 @@
               <a:t>Run</a:t>
             </a:r>
             <a:r>
-              <a:rPr lang="en-US" altLang="ja-JP" sz="1600" dirty="0" smtClean="0"/>
+              <a:rPr lang="en-US" altLang="ja-JP" sz="1600" dirty="0"/>
               <a:t>(</a:t>
             </a:r>
             <a:r>
-              <a:rPr lang="en-US" altLang="ja-JP" sz="1600" dirty="0" err="1" smtClean="0"/>
+              <a:rPr lang="en-US" altLang="ja-JP" sz="1600" dirty="0" err="1"/>
               <a:t>sndhdr.GetRunNum</a:t>
             </a:r>
             <a:r>
-              <a:rPr lang="en-US" altLang="ja-JP" sz="1600" dirty="0" smtClean="0"/>
-              <a:t>()); // -&gt; </a:t>
-            </a:r>
-            <a:r>
               <a:rPr lang="en-US" altLang="ja-JP" sz="1600" dirty="0"/>
-              <a:t>Added at </a:t>
-            </a:r>
-            <a:r>
-              <a:rPr lang="en-US" altLang="ja-JP" sz="1600" dirty="0" smtClean="0">
+              <a:t>()); // -&gt; Added at </a:t>
+            </a:r>
+            <a:r>
+              <a:rPr lang="en-US" altLang="ja-JP" sz="1600" dirty="0">
                 <a:solidFill>
                   <a:srgbClr val="FF0000"/>
                 </a:solidFill>
               </a:rPr>
               <a:t>rev. 8701</a:t>
             </a:r>
-            <a:endParaRPr lang="en-US" altLang="ja-JP" sz="1600" dirty="0" smtClean="0"/>
-          </a:p>
-          <a:p>
-            <a:r>
-              <a:rPr lang="en-US" altLang="ja-JP" sz="1600" dirty="0" smtClean="0"/>
+            <a:endParaRPr lang="en-US" altLang="ja-JP" sz="1600" dirty="0"/>
+          </a:p>
+          <a:p>
+            <a:r>
+              <a:rPr lang="en-US" altLang="ja-JP" sz="1600" dirty="0"/>
               <a:t>  </a:t>
             </a:r>
             <a:r>
-              <a:rPr lang="en-US" altLang="ja-JP" sz="1600" dirty="0" err="1" smtClean="0"/>
+              <a:rPr lang="en-US" altLang="ja-JP" sz="1600" dirty="0" err="1"/>
               <a:t>evtmetadata</a:t>
             </a:r>
             <a:r>
-              <a:rPr lang="en-US" altLang="ja-JP" sz="1600" dirty="0" smtClean="0"/>
+              <a:rPr lang="en-US" altLang="ja-JP" sz="1600" dirty="0"/>
               <a:t>-&gt;</a:t>
             </a:r>
             <a:r>
-              <a:rPr lang="en-US" altLang="ja-JP" sz="1600" dirty="0" err="1" smtClean="0"/>
+              <a:rPr lang="en-US" altLang="ja-JP" sz="1600" dirty="0" err="1"/>
               <a:t>set</a:t>
             </a:r>
             <a:r>
-              <a:rPr lang="en-US" altLang="ja-JP" sz="1600" dirty="0" err="1" smtClean="0">
+              <a:rPr lang="en-US" altLang="ja-JP" sz="1600" dirty="0" err="1">
                 <a:solidFill>
                   <a:srgbClr val="00B0F0"/>
                 </a:solidFill>
@@ -4658,23 +4718,19 @@
               <a:t>Subrun</a:t>
             </a:r>
             <a:r>
-              <a:rPr lang="en-US" altLang="ja-JP" sz="1600" dirty="0" smtClean="0"/>
+              <a:rPr lang="en-US" altLang="ja-JP" sz="1600" dirty="0"/>
               <a:t>(</a:t>
             </a:r>
             <a:r>
-              <a:rPr lang="en-US" altLang="ja-JP" sz="1600" dirty="0" err="1" smtClean="0"/>
+              <a:rPr lang="en-US" altLang="ja-JP" sz="1600" dirty="0" err="1"/>
               <a:t>sndhdr.GetSubRunNum</a:t>
             </a:r>
             <a:r>
-              <a:rPr lang="en-US" altLang="ja-JP" sz="1600" dirty="0" smtClean="0"/>
-              <a:t>());   // -&gt; </a:t>
-            </a:r>
-            <a:r>
               <a:rPr lang="en-US" altLang="ja-JP" sz="1600" dirty="0"/>
-              <a:t>Added at </a:t>
-            </a:r>
-            <a:r>
-              <a:rPr lang="en-US" altLang="ja-JP" sz="1600" dirty="0" smtClean="0">
+              <a:t>());   // -&gt; Added at </a:t>
+            </a:r>
+            <a:r>
+              <a:rPr lang="en-US" altLang="ja-JP" sz="1600" dirty="0">
                 <a:solidFill>
                   <a:srgbClr val="FF0000"/>
                 </a:solidFill>
@@ -4684,23 +4740,23 @@
           </a:p>
           <a:p>
             <a:r>
-              <a:rPr lang="en-US" altLang="ja-JP" sz="1600" dirty="0" smtClean="0"/>
+              <a:rPr lang="en-US" altLang="ja-JP" sz="1600" dirty="0"/>
               <a:t>  </a:t>
             </a:r>
             <a:r>
-              <a:rPr lang="en-US" altLang="ja-JP" sz="1600" dirty="0" err="1" smtClean="0"/>
+              <a:rPr lang="en-US" altLang="ja-JP" sz="1600" dirty="0" err="1"/>
               <a:t>evtmetadata</a:t>
             </a:r>
             <a:r>
-              <a:rPr lang="en-US" altLang="ja-JP" sz="1600" dirty="0" smtClean="0"/>
+              <a:rPr lang="en-US" altLang="ja-JP" sz="1600" dirty="0"/>
               <a:t>-&gt;</a:t>
             </a:r>
             <a:r>
-              <a:rPr lang="en-US" altLang="ja-JP" sz="1600" dirty="0" err="1" smtClean="0"/>
+              <a:rPr lang="en-US" altLang="ja-JP" sz="1600" dirty="0" err="1"/>
               <a:t>set</a:t>
             </a:r>
             <a:r>
-              <a:rPr lang="en-US" altLang="ja-JP" sz="1600" dirty="0" err="1" smtClean="0">
+              <a:rPr lang="en-US" altLang="ja-JP" sz="1600" dirty="0" err="1">
                 <a:solidFill>
                   <a:srgbClr val="00B0F0"/>
                 </a:solidFill>
@@ -4708,58 +4764,54 @@
               <a:t>Event</a:t>
             </a:r>
             <a:r>
-              <a:rPr lang="en-US" altLang="ja-JP" sz="1600" dirty="0" smtClean="0"/>
+              <a:rPr lang="en-US" altLang="ja-JP" sz="1600" dirty="0"/>
               <a:t>(</a:t>
             </a:r>
             <a:r>
-              <a:rPr lang="en-US" altLang="ja-JP" sz="1600" dirty="0" err="1" smtClean="0"/>
+              <a:rPr lang="en-US" altLang="ja-JP" sz="1600" dirty="0" err="1"/>
               <a:t>sndhdr.GetEventNumber</a:t>
             </a:r>
             <a:r>
-              <a:rPr lang="en-US" altLang="ja-JP" sz="1600" dirty="0" smtClean="0"/>
-              <a:t>());  // -&gt; </a:t>
-            </a:r>
-            <a:r>
               <a:rPr lang="en-US" altLang="ja-JP" sz="1600" dirty="0"/>
-              <a:t>Added at </a:t>
-            </a:r>
-            <a:r>
-              <a:rPr lang="en-US" altLang="ja-JP" sz="1600" dirty="0" smtClean="0">
+              <a:t>());  // -&gt; Added at </a:t>
+            </a:r>
+            <a:r>
+              <a:rPr lang="en-US" altLang="ja-JP" sz="1600" dirty="0">
                 <a:solidFill>
                   <a:srgbClr val="FF0000"/>
                 </a:solidFill>
               </a:rPr>
               <a:t>rev. 8338</a:t>
             </a:r>
-            <a:endParaRPr lang="en-US" altLang="ja-JP" sz="1600" dirty="0" smtClean="0"/>
-          </a:p>
-          <a:p>
-            <a:r>
-              <a:rPr lang="en-US" altLang="ja-JP" sz="1600" dirty="0" smtClean="0"/>
+            <a:endParaRPr lang="en-US" altLang="ja-JP" sz="1600" dirty="0"/>
+          </a:p>
+          <a:p>
+            <a:r>
+              <a:rPr lang="en-US" altLang="ja-JP" sz="1600" dirty="0"/>
               <a:t>  if (</a:t>
             </a:r>
             <a:r>
-              <a:rPr lang="en-US" altLang="ja-JP" sz="1600" dirty="0" err="1" smtClean="0"/>
+              <a:rPr lang="en-US" altLang="ja-JP" sz="1600" dirty="0" err="1"/>
               <a:t>error_flag</a:t>
             </a:r>
             <a:r>
-              <a:rPr lang="en-US" altLang="ja-JP" sz="1600" dirty="0" smtClean="0"/>
+              <a:rPr lang="en-US" altLang="ja-JP" sz="1600" dirty="0"/>
               <a:t>) </a:t>
             </a:r>
             <a:r>
-              <a:rPr lang="en-US" altLang="ja-JP" sz="1600" dirty="0" err="1" smtClean="0"/>
+              <a:rPr lang="en-US" altLang="ja-JP" sz="1600" dirty="0" err="1"/>
               <a:t>evtmetadata</a:t>
             </a:r>
             <a:r>
-              <a:rPr lang="en-US" altLang="ja-JP" sz="1600" dirty="0" smtClean="0"/>
+              <a:rPr lang="en-US" altLang="ja-JP" sz="1600" dirty="0"/>
               <a:t>-&gt;</a:t>
             </a:r>
             <a:r>
-              <a:rPr lang="en-US" altLang="ja-JP" sz="1600" dirty="0" err="1" smtClean="0"/>
+              <a:rPr lang="en-US" altLang="ja-JP" sz="1600" dirty="0" err="1"/>
               <a:t>add</a:t>
             </a:r>
             <a:r>
-              <a:rPr lang="en-US" altLang="ja-JP" sz="1600" dirty="0" err="1" smtClean="0">
+              <a:rPr lang="en-US" altLang="ja-JP" sz="1600" dirty="0" err="1">
                 <a:solidFill>
                   <a:srgbClr val="00B0F0"/>
                 </a:solidFill>
@@ -4767,23 +4819,19 @@
               <a:t>ErrorFlag</a:t>
             </a:r>
             <a:r>
-              <a:rPr lang="en-US" altLang="ja-JP" sz="1600" dirty="0" smtClean="0"/>
+              <a:rPr lang="en-US" altLang="ja-JP" sz="1600" dirty="0"/>
               <a:t>(</a:t>
             </a:r>
             <a:r>
-              <a:rPr lang="en-US" altLang="ja-JP" sz="1600" dirty="0" err="1" smtClean="0"/>
+              <a:rPr lang="en-US" altLang="ja-JP" sz="1600" dirty="0" err="1"/>
               <a:t>EventMetaData</a:t>
             </a:r>
             <a:r>
-              <a:rPr lang="en-US" altLang="ja-JP" sz="1600" dirty="0" smtClean="0"/>
-              <a:t>::c_B2LinkCRCError); // </a:t>
-            </a:r>
-            <a:r>
               <a:rPr lang="en-US" altLang="ja-JP" sz="1600" dirty="0"/>
-              <a:t>Added at </a:t>
-            </a:r>
-            <a:r>
-              <a:rPr lang="en-US" altLang="ja-JP" sz="1600" dirty="0" smtClean="0">
+              <a:t>::c_B2LinkCRCError); // Added at </a:t>
+            </a:r>
+            <a:r>
+              <a:rPr lang="en-US" altLang="ja-JP" sz="1600" dirty="0">
                 <a:solidFill>
                   <a:srgbClr val="FF0000"/>
                 </a:solidFill>
@@ -4821,7 +4869,7 @@
           <a:lstStyle/>
           <a:p>
             <a:r>
-              <a:rPr kumimoji="1" lang="en-US" altLang="ja-JP" dirty="0" smtClean="0"/>
+              <a:rPr kumimoji="1" lang="en-US" altLang="ja-JP" dirty="0"/>
               <a:t>Fill values in each variable as follows :</a:t>
             </a:r>
             <a:endParaRPr kumimoji="1" lang="ja-JP" altLang="en-US" dirty="0"/>
@@ -4850,7 +4898,7 @@
           <a:lstStyle/>
           <a:p>
             <a:r>
-              <a:rPr lang="en-US" altLang="ja-JP" u="sng" dirty="0" smtClean="0"/>
+              <a:rPr lang="en-US" altLang="ja-JP" u="sng" dirty="0"/>
               <a:t>Pocket DAQ case : </a:t>
             </a:r>
           </a:p>
@@ -4861,22 +4909,18 @@
             </a:pPr>
             <a:r>
               <a:rPr lang="en-US" altLang="ja-JP" dirty="0"/>
-              <a:t>There is no HLT input </a:t>
-            </a:r>
-            <a:r>
-              <a:rPr lang="en-US" altLang="ja-JP" dirty="0" smtClean="0"/>
-              <a:t>server and filling </a:t>
-            </a:r>
-            <a:r>
-              <a:rPr lang="en-US" altLang="ja-JP" dirty="0" err="1" smtClean="0"/>
+              <a:t>There is no HLT input server and filling </a:t>
+            </a:r>
+            <a:r>
+              <a:rPr lang="en-US" altLang="ja-JP" dirty="0" err="1"/>
               <a:t>EventMetaData</a:t>
             </a:r>
             <a:r>
-              <a:rPr lang="en-US" altLang="ja-JP" dirty="0" smtClean="0"/>
+              <a:rPr lang="en-US" altLang="ja-JP" dirty="0"/>
               <a:t> is done by </a:t>
             </a:r>
             <a:r>
-              <a:rPr lang="en-US" altLang="ja-JP" dirty="0" smtClean="0">
+              <a:rPr lang="en-US" altLang="ja-JP" dirty="0">
                 <a:solidFill>
                   <a:srgbClr val="00B0F0"/>
                 </a:solidFill>
@@ -4884,18 +4928,18 @@
               <a:t>DeSerializerPC.cc</a:t>
             </a:r>
             <a:r>
-              <a:rPr lang="en-US" altLang="ja-JP" dirty="0" smtClean="0"/>
+              <a:rPr lang="en-US" altLang="ja-JP" dirty="0"/>
               <a:t> not Raw2DsModule.cc</a:t>
             </a:r>
             <a:r>
-              <a:rPr lang="en-US" altLang="ja-JP" dirty="0" smtClean="0">
+              <a:rPr lang="en-US" altLang="ja-JP" dirty="0">
                 <a:solidFill>
                   <a:srgbClr val="0070C0"/>
                 </a:solidFill>
               </a:rPr>
               <a:t>.</a:t>
             </a:r>
-            <a:endParaRPr lang="en-US" altLang="ja-JP" dirty="0" smtClean="0"/>
+            <a:endParaRPr lang="en-US" altLang="ja-JP" dirty="0"/>
           </a:p>
           <a:p>
             <a:pPr marL="285750" indent="-285750">
@@ -4903,23 +4947,23 @@
               <a:buChar char="Ø"/>
             </a:pPr>
             <a:r>
-              <a:rPr lang="en-US" altLang="ja-JP" dirty="0" err="1" smtClean="0"/>
+              <a:rPr lang="en-US" altLang="ja-JP" dirty="0" err="1"/>
               <a:t>EventMetaData</a:t>
             </a:r>
             <a:r>
-              <a:rPr lang="en-US" altLang="ja-JP" dirty="0" smtClean="0"/>
+              <a:rPr lang="en-US" altLang="ja-JP" dirty="0"/>
               <a:t>-&gt;</a:t>
             </a:r>
             <a:r>
-              <a:rPr lang="en-US" altLang="ja-JP" dirty="0" err="1" smtClean="0"/>
+              <a:rPr lang="en-US" altLang="ja-JP" dirty="0" err="1"/>
               <a:t>getErrorFlag</a:t>
             </a:r>
             <a:r>
-              <a:rPr lang="en-US" altLang="ja-JP" dirty="0" smtClean="0"/>
+              <a:rPr lang="en-US" altLang="ja-JP" dirty="0"/>
               <a:t>()  can work if you use the DAQ program for data-taking after </a:t>
             </a:r>
             <a:r>
-              <a:rPr lang="en-US" altLang="ja-JP" dirty="0" smtClean="0">
+              <a:rPr lang="en-US" altLang="ja-JP" dirty="0">
                 <a:solidFill>
                   <a:srgbClr val="FF0000"/>
                 </a:solidFill>
@@ -4927,7 +4971,7 @@
               <a:t>rev. 29676</a:t>
             </a:r>
             <a:r>
-              <a:rPr lang="en-US" altLang="ja-JP" dirty="0" smtClean="0"/>
+              <a:rPr lang="en-US" altLang="ja-JP" dirty="0"/>
               <a:t>.</a:t>
             </a:r>
           </a:p>
@@ -4997,7 +5041,7 @@
               <a:t>2</a:t>
             </a:r>
             <a:r>
-              <a:rPr kumimoji="1" lang="en-US" altLang="ja-JP" sz="3600" u="sng" dirty="0" smtClean="0"/>
+              <a:rPr kumimoji="1" lang="en-US" altLang="ja-JP" sz="3600" u="sng" dirty="0"/>
               <a:t>,  Definition of ‘Error event’ and how to avoid the event</a:t>
             </a:r>
             <a:endParaRPr kumimoji="1" lang="ja-JP" altLang="en-US" sz="3600" u="sng" dirty="0"/>
@@ -5061,26 +5105,18 @@
                   <a:srgbClr val="00B0F0"/>
                 </a:solidFill>
               </a:rPr>
-              <a:t>‘Error event</a:t>
-            </a:r>
-            <a:r>
-              <a:rPr lang="en-US" altLang="ja-JP" dirty="0" smtClean="0">
+              <a:t>‘Error event’ in this slides means that its </a:t>
+            </a:r>
+            <a:r>
+              <a:rPr lang="en-US" altLang="ja-JP" dirty="0" err="1">
                 <a:solidFill>
                   <a:srgbClr val="00B0F0"/>
                 </a:solidFill>
               </a:rPr>
-              <a:t>’ in this slides means that its </a:t>
-            </a:r>
-            <a:r>
-              <a:rPr lang="en-US" altLang="ja-JP" dirty="0" err="1" smtClean="0">
-                <a:solidFill>
-                  <a:srgbClr val="00B0F0"/>
-                </a:solidFill>
-              </a:rPr>
               <a:t>EventMetaData.</a:t>
             </a:r>
             <a:r>
-              <a:rPr lang="en-US" altLang="ja-JP" dirty="0" err="1" smtClean="0">
+              <a:rPr lang="en-US" altLang="ja-JP" dirty="0" err="1">
                 <a:solidFill>
                   <a:srgbClr val="FF0000"/>
                 </a:solidFill>
@@ -5088,7 +5124,7 @@
               <a:t>m_errorFlag</a:t>
             </a:r>
             <a:r>
-              <a:rPr lang="en-US" altLang="ja-JP" dirty="0" smtClean="0">
+              <a:rPr lang="en-US" altLang="ja-JP" dirty="0">
                 <a:solidFill>
                   <a:srgbClr val="00B0F0"/>
                 </a:solidFill>
@@ -5112,7 +5148,7 @@
         <p:spPr>
           <a:xfrm>
             <a:off x="624254" y="1459578"/>
-            <a:ext cx="8009793" cy="1477328"/>
+            <a:ext cx="8009793" cy="1754326"/>
           </a:xfrm>
           <a:prstGeom prst="rect">
             <a:avLst/>
@@ -5130,43 +5166,43 @@
           <a:lstStyle/>
           <a:p>
             <a:r>
-              <a:rPr lang="en-US" altLang="ja-JP" dirty="0" smtClean="0"/>
+              <a:rPr lang="en-US" altLang="ja-JP" dirty="0"/>
               <a:t>/** bit-flag format of </a:t>
             </a:r>
             <a:r>
-              <a:rPr lang="en-US" altLang="ja-JP" dirty="0" err="1" smtClean="0"/>
+              <a:rPr lang="en-US" altLang="ja-JP" dirty="0" err="1"/>
               <a:t>m_error_flag</a:t>
             </a:r>
             <a:r>
-              <a:rPr lang="en-US" altLang="ja-JP" dirty="0" smtClean="0"/>
+              <a:rPr lang="en-US" altLang="ja-JP" dirty="0"/>
               <a:t>  */</a:t>
             </a:r>
           </a:p>
           <a:p>
             <a:r>
-              <a:rPr lang="en-US" altLang="ja-JP" dirty="0" err="1" smtClean="0"/>
+              <a:rPr lang="en-US" altLang="ja-JP" dirty="0" err="1"/>
               <a:t>enum</a:t>
             </a:r>
             <a:r>
-              <a:rPr lang="en-US" altLang="ja-JP" dirty="0" smtClean="0"/>
+              <a:rPr lang="en-US" altLang="ja-JP" dirty="0"/>
               <a:t> </a:t>
             </a:r>
             <a:r>
-              <a:rPr lang="en-US" altLang="ja-JP" dirty="0" err="1" smtClean="0"/>
+              <a:rPr lang="en-US" altLang="ja-JP" dirty="0" err="1"/>
               <a:t>EventErrorFlag</a:t>
             </a:r>
             <a:r>
-              <a:rPr lang="en-US" altLang="ja-JP" dirty="0" smtClean="0"/>
+              <a:rPr lang="en-US" altLang="ja-JP" dirty="0"/>
               <a:t> {</a:t>
             </a:r>
           </a:p>
           <a:p>
             <a:r>
-              <a:rPr lang="en-US" altLang="ja-JP" dirty="0" smtClean="0"/>
+              <a:rPr lang="en-US" altLang="ja-JP" dirty="0"/>
               <a:t>   </a:t>
             </a:r>
             <a:r>
-              <a:rPr lang="en-US" altLang="ja-JP" dirty="0" smtClean="0">
+              <a:rPr lang="en-US" altLang="ja-JP" dirty="0">
                 <a:solidFill>
                   <a:srgbClr val="FF0000"/>
                 </a:solidFill>
@@ -5174,17 +5210,23 @@
               <a:t>c_B2LinkCRCError</a:t>
             </a:r>
             <a:r>
-              <a:rPr lang="en-US" altLang="ja-JP" dirty="0" smtClean="0"/>
+              <a:rPr lang="en-US" altLang="ja-JP" dirty="0"/>
               <a:t> = 0x1, /**&lt; Belle2link CRC error  is detected in the event */</a:t>
             </a:r>
           </a:p>
           <a:p>
             <a:r>
-              <a:rPr lang="en-US" altLang="ja-JP" dirty="0" smtClean="0"/>
+              <a:rPr lang="en-US" altLang="ja-JP" dirty="0"/>
               <a:t>   </a:t>
             </a:r>
-            <a:r>
-              <a:rPr lang="en-US" altLang="ja-JP" dirty="0" err="1" smtClean="0">
+          </a:p>
+          <a:p>
+            <a:r>
+              <a:rPr lang="en-US" altLang="ja-JP" dirty="0"/>
+              <a:t>   </a:t>
+            </a:r>
+            <a:r>
+              <a:rPr lang="en-US" altLang="ja-JP" dirty="0" err="1">
                 <a:solidFill>
                   <a:srgbClr val="FF0000"/>
                 </a:solidFill>
@@ -5192,13 +5234,13 @@
               <a:t>c_HLTError</a:t>
             </a:r>
             <a:r>
-              <a:rPr lang="en-US" altLang="ja-JP" dirty="0" smtClean="0"/>
+              <a:rPr lang="en-US" altLang="ja-JP" dirty="0"/>
               <a:t>       = 0x2  /**&lt; Error is returned from HLT modules. */</a:t>
             </a:r>
           </a:p>
           <a:p>
             <a:r>
-              <a:rPr lang="en-US" altLang="ja-JP" dirty="0" smtClean="0"/>
+              <a:rPr lang="en-US" altLang="ja-JP" dirty="0"/>
               <a:t>};</a:t>
             </a:r>
             <a:endParaRPr lang="ja-JP" altLang="en-US" dirty="0"/>
@@ -5228,15 +5270,15 @@
           <a:lstStyle/>
           <a:p>
             <a:r>
-              <a:rPr kumimoji="1" lang="en-US" altLang="ja-JP" dirty="0" smtClean="0"/>
+              <a:rPr kumimoji="1" lang="en-US" altLang="ja-JP" dirty="0"/>
               <a:t>In </a:t>
             </a:r>
             <a:r>
-              <a:rPr kumimoji="1" lang="en-US" altLang="ja-JP" dirty="0" err="1" smtClean="0"/>
+              <a:rPr kumimoji="1" lang="en-US" altLang="ja-JP" dirty="0" err="1"/>
               <a:t>EventMetaData.h</a:t>
             </a:r>
             <a:r>
-              <a:rPr kumimoji="1" lang="en-US" altLang="ja-JP" dirty="0" smtClean="0"/>
+              <a:rPr kumimoji="1" lang="en-US" altLang="ja-JP" dirty="0"/>
               <a:t>,</a:t>
             </a:r>
             <a:endParaRPr kumimoji="1" lang="ja-JP" altLang="en-US" dirty="0"/>
@@ -5251,8 +5293,8 @@
         </p:nvSpPr>
         <p:spPr>
           <a:xfrm>
-            <a:off x="325316" y="3042385"/>
-            <a:ext cx="7865038" cy="369332"/>
+            <a:off x="443302" y="3219815"/>
+            <a:ext cx="7869077" cy="369332"/>
           </a:xfrm>
           <a:prstGeom prst="rect">
             <a:avLst/>
@@ -5266,18 +5308,13 @@
           <a:lstStyle/>
           <a:p>
             <a:r>
-              <a:rPr kumimoji="1" lang="en-US" altLang="ja-JP" dirty="0" smtClean="0"/>
+              <a:rPr kumimoji="1" lang="en-US" altLang="ja-JP" dirty="0"/>
               <a:t>As of Jun. 2016, only </a:t>
             </a:r>
             <a:r>
-              <a:rPr lang="en-US" altLang="ja-JP" dirty="0" smtClean="0"/>
+              <a:rPr lang="en-US" altLang="ja-JP" dirty="0"/>
               <a:t>c_B2LinkCRCError is implemented if using rev. 18569 or later.</a:t>
             </a:r>
-            <a:r>
-              <a:rPr kumimoji="1" lang="en-US" altLang="ja-JP" dirty="0" smtClean="0"/>
-              <a:t> </a:t>
-            </a:r>
-            <a:endParaRPr kumimoji="1" lang="ja-JP" altLang="en-US" dirty="0"/>
           </a:p>
         </p:txBody>
       </p:sp>
@@ -5304,10 +5341,257 @@
           <a:lstStyle/>
           <a:p>
             <a:r>
-              <a:rPr kumimoji="1" lang="en-US" altLang="ja-JP" sz="2400" u="sng" dirty="0" smtClean="0"/>
+              <a:rPr kumimoji="1" lang="en-US" altLang="ja-JP" sz="2400" u="sng" dirty="0"/>
               <a:t>Type of errors</a:t>
             </a:r>
             <a:endParaRPr kumimoji="1" lang="ja-JP" altLang="en-US" sz="2400" u="sng" dirty="0"/>
+          </a:p>
+        </p:txBody>
+      </p:sp>
+      <p:sp>
+        <p:nvSpPr>
+          <p:cNvPr id="10" name="正方形/長方形 9"/>
+          <p:cNvSpPr/>
+          <p:nvPr/>
+        </p:nvSpPr>
+        <p:spPr>
+          <a:xfrm>
+            <a:off x="341840" y="4288109"/>
+            <a:ext cx="8574618" cy="1754326"/>
+          </a:xfrm>
+          <a:prstGeom prst="rect">
+            <a:avLst/>
+          </a:prstGeom>
+          <a:ln>
+            <a:solidFill>
+              <a:schemeClr val="tx2"/>
+            </a:solidFill>
+          </a:ln>
+        </p:spPr>
+        <p:txBody>
+          <a:bodyPr wrap="square">
+            <a:spAutoFit/>
+          </a:bodyPr>
+          <a:lstStyle/>
+          <a:p>
+            <a:r>
+              <a:rPr lang="en-US" altLang="ja-JP" dirty="0"/>
+              <a:t>/** bit-flag format of </a:t>
+            </a:r>
+            <a:r>
+              <a:rPr lang="en-US" altLang="ja-JP" dirty="0" err="1"/>
+              <a:t>m_error_flag</a:t>
+            </a:r>
+            <a:r>
+              <a:rPr lang="en-US" altLang="ja-JP" dirty="0"/>
+              <a:t>  */</a:t>
+            </a:r>
+          </a:p>
+          <a:p>
+            <a:r>
+              <a:rPr lang="en-US" altLang="ja-JP" dirty="0" err="1"/>
+              <a:t>enum</a:t>
+            </a:r>
+            <a:r>
+              <a:rPr lang="en-US" altLang="ja-JP" dirty="0"/>
+              <a:t> </a:t>
+            </a:r>
+            <a:r>
+              <a:rPr lang="en-US" altLang="ja-JP" dirty="0" err="1"/>
+              <a:t>EventErrorFlag</a:t>
+            </a:r>
+            <a:r>
+              <a:rPr lang="en-US" altLang="ja-JP" dirty="0"/>
+              <a:t> {</a:t>
+            </a:r>
+          </a:p>
+          <a:p>
+            <a:r>
+              <a:rPr lang="en-US" altLang="ja-JP" dirty="0"/>
+              <a:t>   </a:t>
+            </a:r>
+            <a:r>
+              <a:rPr lang="en-US" altLang="ja-JP" dirty="0">
+                <a:solidFill>
+                  <a:srgbClr val="FF0000"/>
+                </a:solidFill>
+              </a:rPr>
+              <a:t>c_B2LinkPacketCRCError</a:t>
+            </a:r>
+            <a:r>
+              <a:rPr lang="en-US" altLang="ja-JP" dirty="0"/>
+              <a:t> = 0x1, /**&lt; Belle2link CRC error  is detected in the event */</a:t>
+            </a:r>
+          </a:p>
+          <a:p>
+            <a:r>
+              <a:rPr lang="en-US" altLang="ja-JP" dirty="0"/>
+              <a:t>   </a:t>
+            </a:r>
+            <a:r>
+              <a:rPr lang="en-US" altLang="ja-JP" dirty="0">
+                <a:solidFill>
+                  <a:srgbClr val="FF0000"/>
+                </a:solidFill>
+              </a:rPr>
+              <a:t>c_B2LinkEventCRCError </a:t>
+            </a:r>
+            <a:r>
+              <a:rPr lang="en-US" altLang="ja-JP" dirty="0"/>
+              <a:t>= 0x2 /**&lt; Error is returned from HLT modules. */</a:t>
+            </a:r>
+          </a:p>
+          <a:p>
+            <a:r>
+              <a:rPr lang="en-US" altLang="ja-JP" dirty="0"/>
+              <a:t>   </a:t>
+            </a:r>
+            <a:r>
+              <a:rPr lang="en-US" altLang="ja-JP" dirty="0" err="1">
+                <a:solidFill>
+                  <a:srgbClr val="FF0000"/>
+                </a:solidFill>
+              </a:rPr>
+              <a:t>c_HLTError</a:t>
+            </a:r>
+            <a:r>
+              <a:rPr lang="en-US" altLang="ja-JP" dirty="0"/>
+              <a:t>       = 0x4  /**&lt; Error is returned from HLT modules. */</a:t>
+            </a:r>
+          </a:p>
+          <a:p>
+            <a:r>
+              <a:rPr lang="en-US" altLang="ja-JP" dirty="0"/>
+              <a:t>};</a:t>
+            </a:r>
+            <a:endParaRPr lang="ja-JP" altLang="en-US" dirty="0"/>
+          </a:p>
+        </p:txBody>
+      </p:sp>
+      <p:sp>
+        <p:nvSpPr>
+          <p:cNvPr id="2" name="十字形 1"/>
+          <p:cNvSpPr/>
+          <p:nvPr/>
+        </p:nvSpPr>
+        <p:spPr>
+          <a:xfrm rot="2785864">
+            <a:off x="3386645" y="1116694"/>
+            <a:ext cx="2485009" cy="2440095"/>
+          </a:xfrm>
+          <a:prstGeom prst="plus">
+            <a:avLst>
+              <a:gd name="adj" fmla="val 39511"/>
+            </a:avLst>
+          </a:prstGeom>
+          <a:solidFill>
+            <a:srgbClr val="FF0000">
+              <a:alpha val="60000"/>
+            </a:srgbClr>
+          </a:solidFill>
+        </p:spPr>
+        <p:style>
+          <a:lnRef idx="2">
+            <a:schemeClr val="accent1">
+              <a:shade val="50000"/>
+            </a:schemeClr>
+          </a:lnRef>
+          <a:fillRef idx="1">
+            <a:schemeClr val="accent1"/>
+          </a:fillRef>
+          <a:effectRef idx="0">
+            <a:schemeClr val="accent1"/>
+          </a:effectRef>
+          <a:fontRef idx="minor">
+            <a:schemeClr val="lt1"/>
+          </a:fontRef>
+        </p:style>
+        <p:txBody>
+          <a:bodyPr rtlCol="0" anchor="ctr"/>
+          <a:lstStyle/>
+          <a:p>
+            <a:pPr algn="ctr"/>
+            <a:r>
+              <a:rPr kumimoji="1" lang="en-US" altLang="ja-JP" dirty="0"/>
+              <a:t>obsolete</a:t>
+            </a:r>
+            <a:endParaRPr kumimoji="1" lang="ja-JP" altLang="en-US" dirty="0"/>
+          </a:p>
+        </p:txBody>
+      </p:sp>
+      <p:sp>
+        <p:nvSpPr>
+          <p:cNvPr id="3" name="正方形/長方形 2"/>
+          <p:cNvSpPr/>
+          <p:nvPr/>
+        </p:nvSpPr>
+        <p:spPr>
+          <a:xfrm>
+            <a:off x="589046" y="3850668"/>
+            <a:ext cx="6630458" cy="369332"/>
+          </a:xfrm>
+          <a:prstGeom prst="rect">
+            <a:avLst/>
+          </a:prstGeom>
+        </p:spPr>
+        <p:txBody>
+          <a:bodyPr wrap="square">
+            <a:spAutoFit/>
+          </a:bodyPr>
+          <a:lstStyle/>
+          <a:p>
+            <a:r>
+              <a:rPr lang="en-US" altLang="ja-JP" dirty="0"/>
+              <a:t>On May 30, 2017 ( </a:t>
+            </a:r>
+            <a:r>
+              <a:rPr lang="en-US" altLang="ja-JP" dirty="0">
+                <a:hlinkClick r:id="rId2"/>
+              </a:rPr>
+              <a:t>6085dc98122</a:t>
+            </a:r>
+            <a:r>
+              <a:rPr lang="en-US" altLang="ja-JP" dirty="0"/>
+              <a:t> ), the flag was changed.  </a:t>
+            </a:r>
+            <a:endParaRPr lang="ja-JP" altLang="en-US" dirty="0"/>
+          </a:p>
+        </p:txBody>
+      </p:sp>
+      <p:sp>
+        <p:nvSpPr>
+          <p:cNvPr id="11" name="正方形/長方形 10"/>
+          <p:cNvSpPr/>
+          <p:nvPr/>
+        </p:nvSpPr>
+        <p:spPr>
+          <a:xfrm>
+            <a:off x="589046" y="6045657"/>
+            <a:ext cx="6630458" cy="369332"/>
+          </a:xfrm>
+          <a:prstGeom prst="rect">
+            <a:avLst/>
+          </a:prstGeom>
+        </p:spPr>
+        <p:txBody>
+          <a:bodyPr wrap="square">
+            <a:spAutoFit/>
+          </a:bodyPr>
+          <a:lstStyle/>
+          <a:p>
+            <a:r>
+              <a:rPr lang="en-US" altLang="ja-JP" dirty="0"/>
+              <a:t>So far, no DAQ program stores </a:t>
+            </a:r>
+            <a:r>
+              <a:rPr lang="en-US" altLang="ja-JP" dirty="0" err="1"/>
+              <a:t>c_HLTError</a:t>
+            </a:r>
+            <a:r>
+              <a:rPr lang="en-US" altLang="ja-JP" dirty="0"/>
+              <a:t>. </a:t>
+            </a:r>
+            <a:endParaRPr lang="ja-JP" altLang="en-US" dirty="0"/>
           </a:p>
         </p:txBody>
       </p:sp>
@@ -5349,7 +5633,7 @@
         </p:nvSpPr>
         <p:spPr>
           <a:xfrm>
-            <a:off x="0" y="0"/>
+            <a:off x="3376" y="-72667"/>
             <a:ext cx="6073073" cy="461665"/>
           </a:xfrm>
           <a:prstGeom prst="rect">
@@ -5363,15 +5647,15 @@
           <a:lstStyle/>
           <a:p>
             <a:r>
-              <a:rPr lang="en-US" altLang="ja-JP" sz="2400" u="sng" dirty="0" smtClean="0"/>
+              <a:rPr lang="en-US" altLang="ja-JP" sz="2400" u="sng" dirty="0"/>
               <a:t>What is ‘</a:t>
             </a:r>
             <a:r>
-              <a:rPr lang="en-US" altLang="ja-JP" sz="2400" u="sng" dirty="0" err="1" smtClean="0"/>
+              <a:rPr lang="en-US" altLang="ja-JP" sz="2400" u="sng" dirty="0" err="1"/>
               <a:t>m_errorFlag</a:t>
             </a:r>
             <a:r>
-              <a:rPr lang="en-US" altLang="ja-JP" sz="2400" u="sng" dirty="0" smtClean="0"/>
+              <a:rPr lang="en-US" altLang="ja-JP" sz="2400" u="sng" dirty="0"/>
               <a:t>= c_B2LinkCRCError = 0x1’</a:t>
             </a:r>
             <a:endParaRPr lang="ja-JP" altLang="en-US" sz="2400" u="sng" dirty="0"/>
@@ -5386,8 +5670,8 @@
         </p:nvSpPr>
         <p:spPr>
           <a:xfrm>
-            <a:off x="351691" y="545122"/>
-            <a:ext cx="7869116" cy="1200329"/>
+            <a:off x="440645" y="307635"/>
+            <a:ext cx="7869116" cy="1754326"/>
           </a:xfrm>
           <a:prstGeom prst="rect">
             <a:avLst/>
@@ -5410,25 +5694,25 @@
               <a:buChar char="Ø"/>
             </a:pPr>
             <a:r>
-              <a:rPr kumimoji="1" lang="en-US" altLang="ja-JP" dirty="0" smtClean="0"/>
+              <a:rPr kumimoji="1" lang="en-US" altLang="ja-JP" dirty="0"/>
               <a:t>Data-corruption during B2link data transfer is detected by CRC check.</a:t>
             </a:r>
           </a:p>
           <a:p>
             <a:r>
-              <a:rPr kumimoji="1" lang="en-US" altLang="ja-JP" dirty="0" smtClean="0"/>
+              <a:rPr kumimoji="1" lang="en-US" altLang="ja-JP" dirty="0"/>
               <a:t> -&gt; </a:t>
             </a:r>
             <a:r>
-              <a:rPr lang="en-US" altLang="ja-JP" dirty="0" err="1" smtClean="0"/>
+              <a:rPr lang="en-US" altLang="ja-JP" dirty="0" err="1"/>
               <a:t>m_errorFlag</a:t>
             </a:r>
             <a:r>
-              <a:rPr lang="en-US" altLang="ja-JP" dirty="0" smtClean="0"/>
+              <a:rPr lang="en-US" altLang="ja-JP" dirty="0"/>
               <a:t> = </a:t>
             </a:r>
             <a:r>
-              <a:rPr lang="en-US" altLang="ja-JP" dirty="0" smtClean="0">
+              <a:rPr lang="en-US" altLang="ja-JP" dirty="0">
                 <a:solidFill>
                   <a:srgbClr val="FF0000"/>
                 </a:solidFill>
@@ -5442,37 +5726,65 @@
               <a:buChar char="Ø"/>
             </a:pPr>
             <a:r>
-              <a:rPr lang="en-US" altLang="ja-JP" dirty="0" smtClean="0"/>
-              <a:t>Data-corruption during B2link data transfer is not detected by CRC check.</a:t>
-            </a:r>
-          </a:p>
-          <a:p>
-            <a:r>
-              <a:rPr lang="en-US" altLang="ja-JP" dirty="0" smtClean="0"/>
-              <a:t> </a:t>
-            </a:r>
-            <a:r>
               <a:rPr lang="en-US" altLang="ja-JP" dirty="0"/>
-              <a:t>-&gt; </a:t>
-            </a:r>
-            <a:r>
-              <a:rPr lang="en-US" altLang="ja-JP" dirty="0" err="1" smtClean="0"/>
+              <a:t>Data-corruption during B2link data transfer is detected by CRC check.</a:t>
+            </a:r>
+          </a:p>
+          <a:p>
+            <a:r>
+              <a:rPr lang="en-US" altLang="ja-JP" dirty="0"/>
+              <a:t> -&gt; </a:t>
+            </a:r>
+            <a:r>
+              <a:rPr lang="en-US" altLang="ja-JP" dirty="0" err="1"/>
               <a:t>m_errorFlag</a:t>
             </a:r>
             <a:r>
-              <a:rPr lang="en-US" altLang="ja-JP" dirty="0" smtClean="0"/>
+              <a:rPr lang="en-US" altLang="ja-JP" dirty="0"/>
               <a:t> = </a:t>
             </a:r>
             <a:r>
-              <a:rPr lang="en-US" altLang="ja-JP" dirty="0" smtClean="0">
+              <a:rPr lang="en-US" altLang="ja-JP" dirty="0">
                 <a:solidFill>
                   <a:srgbClr val="FF0000"/>
                 </a:solidFill>
               </a:rPr>
+              <a:t>1</a:t>
+            </a:r>
+          </a:p>
+          <a:p>
+            <a:pPr marL="285750" indent="-285750">
+              <a:buFont typeface="Wingdings" panose="05000000000000000000" pitchFamily="2" charset="2"/>
+              <a:buChar char="Ø"/>
+            </a:pPr>
+            <a:r>
+              <a:rPr lang="en-US" altLang="ja-JP" dirty="0"/>
+              <a:t>Data-corruption during/after B2link data transfer is not detected by CRC check.</a:t>
+            </a:r>
+          </a:p>
+          <a:p>
+            <a:r>
+              <a:rPr lang="en-US" altLang="ja-JP" dirty="0"/>
+              <a:t> -&gt; </a:t>
+            </a:r>
+            <a:r>
+              <a:rPr lang="en-US" altLang="ja-JP" dirty="0" err="1"/>
+              <a:t>m_errorFlag</a:t>
+            </a:r>
+            <a:r>
+              <a:rPr lang="en-US" altLang="ja-JP" dirty="0"/>
+              <a:t> = </a:t>
+            </a:r>
+            <a:r>
+              <a:rPr lang="en-US" altLang="ja-JP" dirty="0">
+                <a:solidFill>
+                  <a:srgbClr val="FF0000"/>
+                </a:solidFill>
+              </a:rPr>
               <a:t>0</a:t>
             </a:r>
             <a:r>
-              <a:rPr kumimoji="1" lang="en-US" altLang="ja-JP" dirty="0" smtClean="0"/>
+              <a:rPr kumimoji="1" lang="en-US" altLang="ja-JP" dirty="0"/>
               <a:t>  </a:t>
             </a:r>
             <a:endParaRPr kumimoji="1" lang="ja-JP" altLang="en-US" dirty="0"/>
@@ -5516,7 +5828,7 @@
           <a:p>
             <a:pPr algn="ctr"/>
             <a:r>
-              <a:rPr lang="en-US" altLang="ja-JP" dirty="0" smtClean="0"/>
+              <a:rPr lang="en-US" altLang="ja-JP" dirty="0"/>
               <a:t>FEE</a:t>
             </a:r>
             <a:endParaRPr kumimoji="1" lang="ja-JP" altLang="en-US" dirty="0"/>
@@ -5587,14 +5899,14 @@
           <a:p>
             <a:pPr algn="ctr"/>
             <a:r>
-              <a:rPr kumimoji="1" lang="en-US" altLang="ja-JP" dirty="0" smtClean="0"/>
+              <a:rPr kumimoji="1" lang="en-US" altLang="ja-JP" dirty="0"/>
               <a:t>B2link</a:t>
             </a:r>
           </a:p>
           <a:p>
             <a:pPr algn="ctr"/>
             <a:r>
-              <a:rPr lang="en-US" altLang="ja-JP" dirty="0" smtClean="0"/>
+              <a:rPr lang="en-US" altLang="ja-JP" dirty="0"/>
               <a:t>core</a:t>
             </a:r>
             <a:endParaRPr kumimoji="1" lang="ja-JP" altLang="en-US" dirty="0"/>
@@ -5638,7 +5950,7 @@
           <a:p>
             <a:pPr algn="ctr"/>
             <a:r>
-              <a:rPr lang="en-US" altLang="ja-JP" dirty="0" smtClean="0"/>
+              <a:rPr lang="en-US" altLang="ja-JP" dirty="0"/>
               <a:t>COPPER</a:t>
             </a:r>
             <a:endParaRPr kumimoji="1" lang="ja-JP" altLang="en-US" dirty="0"/>
@@ -5682,7 +5994,7 @@
           <a:p>
             <a:pPr algn="ctr"/>
             <a:r>
-              <a:rPr lang="en-US" altLang="ja-JP" dirty="0" smtClean="0"/>
+              <a:rPr lang="en-US" altLang="ja-JP" dirty="0"/>
               <a:t>ROPC</a:t>
             </a:r>
             <a:endParaRPr kumimoji="1" lang="ja-JP" altLang="en-US" dirty="0"/>
@@ -5917,18 +6229,14 @@
           <a:lstStyle/>
           <a:p>
             <a:r>
-              <a:rPr kumimoji="1" lang="en-US" altLang="ja-JP" dirty="0" smtClean="0"/>
+              <a:rPr kumimoji="1" lang="en-US" altLang="ja-JP" dirty="0"/>
               <a:t>Calculate CRC value </a:t>
             </a:r>
           </a:p>
           <a:p>
             <a:r>
               <a:rPr lang="en-US" altLang="ja-JP" dirty="0"/>
-              <a:t>a</a:t>
-            </a:r>
-            <a:r>
-              <a:rPr lang="en-US" altLang="ja-JP" dirty="0" smtClean="0"/>
-              <a:t>nd stores it.</a:t>
+              <a:t>and stores it.</a:t>
             </a:r>
             <a:endParaRPr kumimoji="1" lang="ja-JP" altLang="en-US" dirty="0"/>
           </a:p>
@@ -5957,73 +6265,73 @@
           <a:lstStyle/>
           <a:p>
             <a:r>
-              <a:rPr kumimoji="1" lang="en-US" altLang="ja-JP" dirty="0" smtClean="0"/>
+              <a:rPr kumimoji="1" lang="en-US" altLang="ja-JP" dirty="0"/>
               <a:t>ROPC re-calculates </a:t>
             </a:r>
             <a:r>
-              <a:rPr lang="en-US" altLang="ja-JP" dirty="0" smtClean="0"/>
+              <a:rPr lang="en-US" altLang="ja-JP" dirty="0"/>
               <a:t>the</a:t>
             </a:r>
             <a:r>
-              <a:rPr kumimoji="1" lang="en-US" altLang="ja-JP" dirty="0" smtClean="0"/>
+              <a:rPr kumimoji="1" lang="en-US" altLang="ja-JP" dirty="0"/>
               <a:t> CRC value</a:t>
             </a:r>
           </a:p>
           <a:p>
             <a:r>
-              <a:rPr lang="en-US" altLang="ja-JP" dirty="0" smtClean="0"/>
+              <a:rPr lang="en-US" altLang="ja-JP" dirty="0"/>
               <a:t>and compare it with the CRC value in a trailer.  </a:t>
             </a:r>
           </a:p>
           <a:p>
             <a:r>
-              <a:rPr kumimoji="1" lang="en-US" altLang="ja-JP" dirty="0" smtClean="0"/>
+              <a:rPr kumimoji="1" lang="en-US" altLang="ja-JP" dirty="0"/>
               <a:t>If they don’t coincide, error bit </a:t>
             </a:r>
             <a:r>
-              <a:rPr lang="en-US" altLang="ja-JP" dirty="0" smtClean="0"/>
+              <a:rPr lang="en-US" altLang="ja-JP" dirty="0"/>
               <a:t>in </a:t>
             </a:r>
             <a:r>
-              <a:rPr kumimoji="1" lang="en-US" altLang="ja-JP" dirty="0" smtClean="0"/>
+              <a:rPr kumimoji="1" lang="en-US" altLang="ja-JP" dirty="0"/>
               <a:t>the </a:t>
             </a:r>
             <a:r>
-              <a:rPr kumimoji="1" lang="en-US" altLang="ja-JP" dirty="0" err="1" smtClean="0"/>
+              <a:rPr kumimoji="1" lang="en-US" altLang="ja-JP" dirty="0" err="1"/>
               <a:t>RawCOPPER</a:t>
             </a:r>
             <a:r>
-              <a:rPr kumimoji="1" lang="en-US" altLang="ja-JP" dirty="0" smtClean="0"/>
+              <a:rPr kumimoji="1" lang="en-US" altLang="ja-JP" dirty="0"/>
               <a:t> header(not </a:t>
             </a:r>
             <a:r>
-              <a:rPr kumimoji="1" lang="en-US" altLang="ja-JP" dirty="0" err="1" smtClean="0"/>
+              <a:rPr kumimoji="1" lang="en-US" altLang="ja-JP" dirty="0" err="1"/>
               <a:t>EventMetaData</a:t>
             </a:r>
             <a:r>
-              <a:rPr kumimoji="1" lang="en-US" altLang="ja-JP" dirty="0" smtClean="0"/>
+              <a:rPr kumimoji="1" lang="en-US" altLang="ja-JP" dirty="0"/>
               <a:t>) </a:t>
             </a:r>
             <a:r>
-              <a:rPr lang="en-US" altLang="ja-JP" dirty="0" smtClean="0"/>
+              <a:rPr lang="en-US" altLang="ja-JP" dirty="0"/>
               <a:t>is set. </a:t>
             </a:r>
           </a:p>
           <a:p>
             <a:r>
-              <a:rPr kumimoji="1" lang="en-US" altLang="ja-JP" dirty="0" smtClean="0"/>
+              <a:rPr kumimoji="1" lang="en-US" altLang="ja-JP" dirty="0"/>
               <a:t>Later, the header is checked by Raw2DsModule on HLT and </a:t>
             </a:r>
             <a:r>
-              <a:rPr lang="en-US" altLang="ja-JP" dirty="0" err="1" smtClean="0"/>
+              <a:rPr lang="en-US" altLang="ja-JP" dirty="0" err="1"/>
               <a:t>m_errorFlag</a:t>
             </a:r>
             <a:r>
-              <a:rPr lang="en-US" altLang="ja-JP" u="sng" dirty="0" smtClean="0"/>
+              <a:rPr lang="en-US" altLang="ja-JP" u="sng" dirty="0"/>
               <a:t> </a:t>
             </a:r>
             <a:r>
-              <a:rPr kumimoji="1" lang="en-US" altLang="ja-JP" dirty="0" smtClean="0"/>
+              <a:rPr kumimoji="1" lang="en-US" altLang="ja-JP" dirty="0"/>
               <a:t>is set to 1.</a:t>
             </a:r>
             <a:endParaRPr kumimoji="1" lang="ja-JP" altLang="en-US" dirty="0"/>
@@ -6053,7 +6361,7 @@
           <a:lstStyle/>
           <a:p>
             <a:r>
-              <a:rPr kumimoji="1" lang="en-US" altLang="ja-JP" dirty="0" smtClean="0"/>
+              <a:rPr kumimoji="1" lang="en-US" altLang="ja-JP" dirty="0"/>
               <a:t>To HLT</a:t>
             </a:r>
             <a:endParaRPr kumimoji="1" lang="ja-JP" altLang="en-US" dirty="0"/>
@@ -6112,7 +6420,7 @@
           <a:lstStyle/>
           <a:p>
             <a:r>
-              <a:rPr lang="en-US" altLang="ja-JP" sz="2400" u="sng" dirty="0" smtClean="0"/>
+              <a:rPr lang="en-US" altLang="ja-JP" sz="2400" u="sng" dirty="0"/>
               <a:t>How to avoid CRC ‘error events’   : </a:t>
             </a:r>
           </a:p>
@@ -6140,28 +6448,28 @@
           <a:lstStyle/>
           <a:p>
             <a:r>
-              <a:rPr lang="en-US" altLang="ja-JP" sz="1600" dirty="0" smtClean="0"/>
+              <a:rPr lang="en-US" altLang="ja-JP" sz="1600" dirty="0"/>
               <a:t>call </a:t>
             </a:r>
             <a:r>
-              <a:rPr lang="en-US" altLang="ja-JP" sz="1600" dirty="0" err="1" smtClean="0"/>
+              <a:rPr lang="en-US" altLang="ja-JP" sz="1600" dirty="0" err="1"/>
               <a:t>getErrorFlag</a:t>
             </a:r>
             <a:r>
-              <a:rPr lang="en-US" altLang="ja-JP" sz="1600" dirty="0" smtClean="0"/>
+              <a:rPr lang="en-US" altLang="ja-JP" sz="1600" dirty="0"/>
               <a:t>() of </a:t>
             </a:r>
             <a:r>
-              <a:rPr lang="en-US" altLang="ja-JP" sz="1600" dirty="0" err="1" smtClean="0"/>
+              <a:rPr lang="en-US" altLang="ja-JP" sz="1600" dirty="0" err="1"/>
               <a:t>EventMetaData</a:t>
             </a:r>
             <a:r>
-              <a:rPr lang="en-US" altLang="ja-JP" sz="1600" dirty="0" smtClean="0"/>
+              <a:rPr lang="en-US" altLang="ja-JP" sz="1600" dirty="0"/>
               <a:t>: </a:t>
             </a:r>
           </a:p>
           <a:p>
-            <a:endParaRPr lang="en-US" altLang="ja-JP" sz="1600" dirty="0" smtClean="0"/>
+            <a:endParaRPr lang="en-US" altLang="ja-JP" sz="1600" dirty="0"/>
           </a:p>
         </p:txBody>
       </p:sp>
@@ -6267,15 +6575,17 @@
                   <a:schemeClr val="tx1"/>
                 </a:solidFill>
               </a:rPr>
-              <a:t>== 0 </a:t>
-            </a:r>
-            <a:r>
-              <a:rPr lang="en-US" altLang="ja-JP" sz="1400" dirty="0" smtClean="0">
+              <a:t>== 0 ){   </a:t>
+            </a:r>
+          </a:p>
+          <a:p>
+            <a:r>
+              <a:rPr lang="en-US" altLang="ja-JP" sz="1400" dirty="0">
                 <a:solidFill>
                   <a:schemeClr val="tx1"/>
                 </a:solidFill>
               </a:rPr>
-              <a:t>){   </a:t>
+              <a:t>	// No CRC error </a:t>
             </a:r>
           </a:p>
           <a:p>
@@ -6285,90 +6595,22 @@
                   <a:schemeClr val="tx1"/>
                 </a:solidFill>
               </a:rPr>
-              <a:t>	</a:t>
-            </a:r>
-            <a:r>
-              <a:rPr lang="en-US" altLang="ja-JP" sz="1400" dirty="0" smtClean="0">
+              <a:t>	}else{</a:t>
+            </a:r>
+          </a:p>
+          <a:p>
+            <a:r>
+              <a:rPr lang="en-US" altLang="ja-JP" sz="1400" dirty="0">
                 <a:solidFill>
                   <a:schemeClr val="tx1"/>
                 </a:solidFill>
               </a:rPr>
-              <a:t>// </a:t>
-            </a:r>
+              <a:t>	  // CRC error event  }</a:t>
+            </a:r>
+          </a:p>
+          <a:p>
             <a:r>
               <a:rPr lang="en-US" altLang="ja-JP" sz="1400" dirty="0">
-                <a:solidFill>
-                  <a:schemeClr val="tx1"/>
-                </a:solidFill>
-              </a:rPr>
-              <a:t>No CRC </a:t>
-            </a:r>
-            <a:r>
-              <a:rPr lang="en-US" altLang="ja-JP" sz="1400" dirty="0" smtClean="0">
-                <a:solidFill>
-                  <a:schemeClr val="tx1"/>
-                </a:solidFill>
-              </a:rPr>
-              <a:t>error </a:t>
-            </a:r>
-          </a:p>
-          <a:p>
-            <a:r>
-              <a:rPr lang="en-US" altLang="ja-JP" sz="1400" dirty="0">
-                <a:solidFill>
-                  <a:schemeClr val="tx1"/>
-                </a:solidFill>
-              </a:rPr>
-              <a:t>	}</a:t>
-            </a:r>
-            <a:r>
-              <a:rPr lang="en-US" altLang="ja-JP" sz="1400" dirty="0" smtClean="0">
-                <a:solidFill>
-                  <a:schemeClr val="tx1"/>
-                </a:solidFill>
-              </a:rPr>
-              <a:t>else{</a:t>
-            </a:r>
-            <a:endParaRPr lang="en-US" altLang="ja-JP" sz="1400" dirty="0">
-              <a:solidFill>
-                <a:schemeClr val="tx1"/>
-              </a:solidFill>
-            </a:endParaRPr>
-          </a:p>
-          <a:p>
-            <a:r>
-              <a:rPr lang="en-US" altLang="ja-JP" sz="1400" dirty="0" smtClean="0">
-                <a:solidFill>
-                  <a:schemeClr val="tx1"/>
-                </a:solidFill>
-              </a:rPr>
-              <a:t>	  // </a:t>
-            </a:r>
-            <a:r>
-              <a:rPr lang="en-US" altLang="ja-JP" sz="1400" dirty="0">
-                <a:solidFill>
-                  <a:schemeClr val="tx1"/>
-                </a:solidFill>
-              </a:rPr>
-              <a:t>CRC error </a:t>
-            </a:r>
-            <a:r>
-              <a:rPr lang="en-US" altLang="ja-JP" sz="1400" dirty="0" smtClean="0">
-                <a:solidFill>
-                  <a:schemeClr val="tx1"/>
-                </a:solidFill>
-              </a:rPr>
-              <a:t>event  }</a:t>
-            </a:r>
-            <a:endParaRPr lang="en-US" altLang="ja-JP" sz="1400" dirty="0">
-              <a:solidFill>
-                <a:schemeClr val="tx1"/>
-              </a:solidFill>
-            </a:endParaRPr>
-          </a:p>
-          <a:p>
-            <a:r>
-              <a:rPr lang="en-US" altLang="ja-JP" sz="1400" dirty="0" smtClean="0">
                 <a:solidFill>
                   <a:schemeClr val="tx1"/>
                 </a:solidFill>
@@ -6424,20 +6666,12 @@
               <a:buChar char="Ø"/>
             </a:pPr>
             <a:r>
-              <a:rPr lang="en-US" altLang="ja-JP" sz="1400" dirty="0" smtClean="0">
+              <a:rPr lang="en-US" altLang="ja-JP" sz="1400" dirty="0">
                 <a:solidFill>
                   <a:schemeClr val="tx1"/>
                 </a:solidFill>
               </a:rPr>
-              <a:t>For </a:t>
-            </a:r>
-            <a:r>
-              <a:rPr lang="en-US" altLang="ja-JP" sz="1400" dirty="0">
-                <a:solidFill>
-                  <a:schemeClr val="tx1"/>
-                </a:solidFill>
-              </a:rPr>
-              <a:t>data taken with older DAQ program, you need to check each Raw*** object like the following;  (*** is COPPER/SVD/CDC/TOP/ARICH/KLM )</a:t>
+              <a:t>For data taken with older DAQ program, you need to check each Raw*** object like the following;  (*** is COPPER/SVD/CDC/TOP/ARICH/KLM )</a:t>
             </a:r>
           </a:p>
           <a:p>
@@ -6763,15 +6997,15 @@
           <a:lstStyle/>
           <a:p>
             <a:r>
-              <a:rPr lang="en-US" altLang="ja-JP" sz="1600" u="sng" dirty="0" smtClean="0"/>
+              <a:rPr lang="en-US" altLang="ja-JP" sz="1600" u="sng" dirty="0"/>
               <a:t>If the ver. of your DAQ program is old: (</a:t>
             </a:r>
             <a:r>
-              <a:rPr lang="en-US" altLang="ja-JP" sz="1600" u="sng" dirty="0" err="1" smtClean="0"/>
+              <a:rPr lang="en-US" altLang="ja-JP" sz="1600" u="sng" dirty="0" err="1"/>
               <a:t>PocketDAQ</a:t>
             </a:r>
             <a:r>
-              <a:rPr lang="en-US" altLang="ja-JP" sz="1600" u="sng" dirty="0" smtClean="0"/>
+              <a:rPr lang="en-US" altLang="ja-JP" sz="1600" u="sng" dirty="0"/>
               <a:t> before 29676, Belle2DAQ before rev. 18569  )</a:t>
             </a:r>
           </a:p>
@@ -6800,15 +7034,15 @@
           <a:lstStyle/>
           <a:p>
             <a:r>
-              <a:rPr kumimoji="1" lang="en-US" altLang="ja-JP" sz="1600" dirty="0" smtClean="0"/>
+              <a:rPr kumimoji="1" lang="en-US" altLang="ja-JP" sz="1600" dirty="0"/>
               <a:t>You need to check every Raw*** objects except for </a:t>
             </a:r>
             <a:r>
-              <a:rPr kumimoji="1" lang="en-US" altLang="ja-JP" sz="1600" dirty="0" err="1" smtClean="0"/>
+              <a:rPr kumimoji="1" lang="en-US" altLang="ja-JP" sz="1600" dirty="0" err="1"/>
               <a:t>RawPXD</a:t>
             </a:r>
             <a:r>
-              <a:rPr kumimoji="1" lang="en-US" altLang="ja-JP" sz="1600" dirty="0" smtClean="0"/>
+              <a:rPr kumimoji="1" lang="en-US" altLang="ja-JP" sz="1600" dirty="0"/>
               <a:t>.</a:t>
             </a:r>
             <a:endParaRPr kumimoji="1" lang="ja-JP" altLang="en-US" sz="1600" dirty="0"/>
@@ -6870,23 +7104,15 @@
             <a:pPr algn="ctr"/>
             <a:r>
               <a:rPr lang="en-US" altLang="ja-JP" sz="3200" u="sng" dirty="0"/>
-              <a:t>Test program to </a:t>
-            </a:r>
-            <a:r>
-              <a:rPr lang="en-US" altLang="ja-JP" sz="3200" u="sng" dirty="0" smtClean="0"/>
-              <a:t>check error flag in </a:t>
-            </a:r>
-            <a:r>
-              <a:rPr lang="en-US" altLang="ja-JP" sz="3200" u="sng" dirty="0" err="1" smtClean="0"/>
+              <a:t>Test program to check error flag in </a:t>
+            </a:r>
+            <a:r>
+              <a:rPr lang="en-US" altLang="ja-JP" sz="3200" u="sng" dirty="0" err="1"/>
               <a:t>EventMetaData</a:t>
             </a:r>
             <a:r>
-              <a:rPr lang="en-US" altLang="ja-JP" sz="3200" u="sng" dirty="0" smtClean="0"/>
-              <a:t> </a:t>
-            </a:r>
-            <a:r>
               <a:rPr lang="en-US" altLang="ja-JP" sz="3200" u="sng" dirty="0"/>
-              <a:t>in .(s)root files</a:t>
+              <a:t> in .(s)root files</a:t>
             </a:r>
           </a:p>
         </p:txBody>
@@ -6914,70 +7140,58 @@
           <a:lstStyle/>
           <a:p>
             <a:r>
-              <a:rPr lang="en-US" altLang="ja-JP" sz="2000" dirty="0" smtClean="0"/>
+              <a:rPr lang="en-US" altLang="ja-JP" sz="2000" dirty="0"/>
               <a:t>$ cd ${BELLE2_LOCAL_DIR}/</a:t>
             </a:r>
             <a:r>
-              <a:rPr lang="en-US" altLang="ja-JP" sz="2000" dirty="0" err="1" smtClean="0"/>
+              <a:rPr lang="en-US" altLang="ja-JP" sz="2000" dirty="0" err="1"/>
               <a:t>daq</a:t>
             </a:r>
             <a:r>
-              <a:rPr lang="en-US" altLang="ja-JP" sz="2000" dirty="0" smtClean="0"/>
+              <a:rPr lang="en-US" altLang="ja-JP" sz="2000" dirty="0"/>
               <a:t>/</a:t>
             </a:r>
             <a:r>
-              <a:rPr lang="en-US" altLang="ja-JP" sz="2000" dirty="0" err="1" smtClean="0"/>
+              <a:rPr lang="en-US" altLang="ja-JP" sz="2000" dirty="0" err="1"/>
               <a:t>rawdata</a:t>
             </a:r>
             <a:r>
-              <a:rPr lang="en-US" altLang="ja-JP" sz="2000" dirty="0" smtClean="0"/>
+              <a:rPr lang="en-US" altLang="ja-JP" sz="2000" dirty="0"/>
               <a:t>/examples</a:t>
             </a:r>
           </a:p>
           <a:p>
             <a:r>
-              <a:rPr lang="en-US" altLang="ja-JP" sz="2000" dirty="0" smtClean="0"/>
-              <a:t>$ </a:t>
-            </a:r>
-            <a:r>
               <a:rPr lang="en-US" altLang="ja-JP" sz="2000" dirty="0"/>
-              <a:t>basf2 CheckErrorEvent.py </a:t>
-            </a:r>
-            <a:r>
-              <a:rPr lang="en-US" altLang="ja-JP" sz="2000" dirty="0" smtClean="0"/>
-              <a:t>–</a:t>
-            </a:r>
-            <a:r>
-              <a:rPr lang="en-US" altLang="ja-JP" sz="2000" dirty="0" err="1" smtClean="0"/>
+              <a:t>$ basf2 CheckErrorEvent.py –</a:t>
+            </a:r>
+            <a:r>
+              <a:rPr lang="en-US" altLang="ja-JP" sz="2000" dirty="0" err="1"/>
               <a:t>i</a:t>
             </a:r>
             <a:r>
-              <a:rPr lang="en-US" altLang="ja-JP" sz="2000" dirty="0" smtClean="0"/>
+              <a:rPr lang="en-US" altLang="ja-JP" sz="2000" dirty="0"/>
               <a:t> &lt;.</a:t>
             </a:r>
             <a:r>
-              <a:rPr lang="en-US" altLang="ja-JP" sz="2000" dirty="0" err="1" smtClean="0"/>
+              <a:rPr lang="en-US" altLang="ja-JP" sz="2000" dirty="0" err="1"/>
               <a:t>sroot</a:t>
             </a:r>
             <a:r>
-              <a:rPr lang="en-US" altLang="ja-JP" sz="2000" dirty="0" smtClean="0"/>
+              <a:rPr lang="en-US" altLang="ja-JP" sz="2000" dirty="0"/>
               <a:t> file&gt;</a:t>
             </a:r>
           </a:p>
           <a:p>
             <a:r>
-              <a:rPr lang="en-US" altLang="ja-JP" sz="1200" dirty="0" smtClean="0"/>
+              <a:rPr lang="en-US" altLang="ja-JP" sz="1200" dirty="0"/>
               <a:t>…</a:t>
             </a:r>
           </a:p>
           <a:p>
             <a:r>
-              <a:rPr lang="en-US" altLang="ja-JP" sz="1200" dirty="0" smtClean="0"/>
-              <a:t>[</a:t>
-            </a:r>
-            <a:r>
               <a:rPr lang="en-US" altLang="ja-JP" sz="1200" dirty="0"/>
-              <a:t>INFO] Reading </a:t>
+              <a:t>[INFO] Reading </a:t>
             </a:r>
             <a:r>
               <a:rPr lang="en-US" altLang="ja-JP" sz="1200" dirty="0" err="1"/>
@@ -7064,28 +7278,19 @@
           <a:p>
             <a:r>
               <a:rPr lang="en-US" altLang="ja-JP" sz="1200" dirty="0"/>
-              <a:t>[INFO] Processed:   1 runs,      2 </a:t>
-            </a:r>
-            <a:r>
-              <a:rPr lang="en-US" altLang="ja-JP" sz="1200" dirty="0" smtClean="0"/>
-              <a:t>events</a:t>
-            </a:r>
-          </a:p>
-          <a:p>
-            <a:r>
-              <a:rPr lang="en-US" altLang="ja-JP" sz="1200" dirty="0" smtClean="0"/>
+              <a:t>[INFO] Processed:   1 runs,      2 events</a:t>
+            </a:r>
+          </a:p>
+          <a:p>
+            <a:r>
+              <a:rPr lang="en-US" altLang="ja-JP" sz="1200" dirty="0"/>
               <a:t>…</a:t>
             </a:r>
-            <a:endParaRPr lang="en-US" altLang="ja-JP" sz="1200" dirty="0"/>
-          </a:p>
-          <a:p>
-            <a:r>
-              <a:rPr lang="en-US" altLang="ja-JP" sz="1200" dirty="0" smtClean="0"/>
-              <a:t> [</a:t>
-            </a:r>
+          </a:p>
+          <a:p>
             <a:r>
               <a:rPr lang="en-US" altLang="ja-JP" sz="1200" dirty="0"/>
-              <a:t>INFO] Processed:   1 runs,   7000 events</a:t>
+              <a:t> [INFO] Processed:   1 runs,   7000 events</a:t>
             </a:r>
           </a:p>
           <a:p>
@@ -7234,15 +7439,11 @@
           </a:p>
           <a:p>
             <a:r>
-              <a:rPr lang="en-US" altLang="ja-JP" sz="1400" b="1" dirty="0" smtClean="0"/>
-              <a:t>-&gt; </a:t>
-            </a:r>
-            <a:r>
-              <a:rPr lang="en-US" altLang="ja-JP" sz="1400" b="1" dirty="0" smtClean="0"/>
-              <a:t>In this case, No CRC ‘error events’ </a:t>
-            </a:r>
-            <a:r>
-              <a:rPr lang="en-US" altLang="ja-JP" sz="1400" b="1" dirty="0" smtClean="0">
+              <a:rPr lang="en-US" altLang="ja-JP" sz="1400" b="1" dirty="0"/>
+              <a:t>-&gt; In this case, No CRC ‘error events’ </a:t>
+            </a:r>
+            <a:r>
+              <a:rPr lang="en-US" altLang="ja-JP" sz="1400" b="1" dirty="0">
                 <a:solidFill>
                   <a:srgbClr val="00B0F0"/>
                 </a:solidFill>
@@ -7250,7 +7451,7 @@
               <a:t>stored in </a:t>
             </a:r>
             <a:r>
-              <a:rPr lang="en-US" altLang="ja-JP" sz="1400" b="1" dirty="0" err="1" smtClean="0">
+              <a:rPr lang="en-US" altLang="ja-JP" sz="1400" b="1" dirty="0" err="1">
                 <a:solidFill>
                   <a:srgbClr val="00B0F0"/>
                 </a:solidFill>
@@ -7258,7 +7459,7 @@
               <a:t>EventMetaData</a:t>
             </a:r>
             <a:r>
-              <a:rPr lang="en-US" altLang="ja-JP" sz="1400" b="1" dirty="0" smtClean="0">
+              <a:rPr lang="en-US" altLang="ja-JP" sz="1400" b="1" dirty="0">
                 <a:solidFill>
                   <a:srgbClr val="00B0F0"/>
                 </a:solidFill>
@@ -7266,7 +7467,7 @@
               <a:t> </a:t>
             </a:r>
             <a:r>
-              <a:rPr lang="en-US" altLang="ja-JP" sz="1400" b="1" dirty="0" smtClean="0"/>
+              <a:rPr lang="en-US" altLang="ja-JP" sz="1400" b="1" dirty="0"/>
               <a:t>are detected.</a:t>
             </a:r>
             <a:endParaRPr kumimoji="1" lang="en-US" altLang="ja-JP" sz="1400" b="1" dirty="0"/>
@@ -7294,7 +7495,7 @@
         <a:sysClr val="windowText" lastClr="000000"/>
       </a:dk1>
       <a:lt1>
-        <a:sysClr val="window" lastClr="BFBFBF"/>
+        <a:sysClr val="window" lastClr="FFFFFF"/>
       </a:lt1>
       <a:dk2>
         <a:srgbClr val="44546A"/>

</xml_diff>